<commit_message>
updated diagrams and stats
</commit_message>
<xml_diff>
--- a/Acorn_diagrams.pptx
+++ b/Acorn_diagrams.pptx
@@ -11,6 +11,7 @@
     <p:sldId id="259" r:id="rId5"/>
     <p:sldId id="260" r:id="rId6"/>
     <p:sldId id="262" r:id="rId7"/>
+    <p:sldId id="263" r:id="rId8"/>
   </p:sldIdLst>
   <p:sldSz cx="12192000" cy="6858000"/>
   <p:notesSz cx="6858000" cy="9144000"/>
@@ -248,7 +249,7 @@
           <a:p>
             <a:fld id="{1C95C1E8-FF19-4248-A4A0-1C9093B41962}" type="datetimeFigureOut">
               <a:rPr lang="en-US" smtClean="0"/>
-              <a:t>1/25/2020</a:t>
+              <a:t>3/4/2020</a:t>
             </a:fld>
             <a:endParaRPr lang="en-US"/>
           </a:p>
@@ -418,7 +419,7 @@
           <a:p>
             <a:fld id="{1C95C1E8-FF19-4248-A4A0-1C9093B41962}" type="datetimeFigureOut">
               <a:rPr lang="en-US" smtClean="0"/>
-              <a:t>1/25/2020</a:t>
+              <a:t>3/4/2020</a:t>
             </a:fld>
             <a:endParaRPr lang="en-US"/>
           </a:p>
@@ -598,7 +599,7 @@
           <a:p>
             <a:fld id="{1C95C1E8-FF19-4248-A4A0-1C9093B41962}" type="datetimeFigureOut">
               <a:rPr lang="en-US" smtClean="0"/>
-              <a:t>1/25/2020</a:t>
+              <a:t>3/4/2020</a:t>
             </a:fld>
             <a:endParaRPr lang="en-US"/>
           </a:p>
@@ -768,7 +769,7 @@
           <a:p>
             <a:fld id="{1C95C1E8-FF19-4248-A4A0-1C9093B41962}" type="datetimeFigureOut">
               <a:rPr lang="en-US" smtClean="0"/>
-              <a:t>1/25/2020</a:t>
+              <a:t>3/4/2020</a:t>
             </a:fld>
             <a:endParaRPr lang="en-US"/>
           </a:p>
@@ -1014,7 +1015,7 @@
           <a:p>
             <a:fld id="{1C95C1E8-FF19-4248-A4A0-1C9093B41962}" type="datetimeFigureOut">
               <a:rPr lang="en-US" smtClean="0"/>
-              <a:t>1/25/2020</a:t>
+              <a:t>3/4/2020</a:t>
             </a:fld>
             <a:endParaRPr lang="en-US"/>
           </a:p>
@@ -1246,7 +1247,7 @@
           <a:p>
             <a:fld id="{1C95C1E8-FF19-4248-A4A0-1C9093B41962}" type="datetimeFigureOut">
               <a:rPr lang="en-US" smtClean="0"/>
-              <a:t>1/25/2020</a:t>
+              <a:t>3/4/2020</a:t>
             </a:fld>
             <a:endParaRPr lang="en-US"/>
           </a:p>
@@ -1613,7 +1614,7 @@
           <a:p>
             <a:fld id="{1C95C1E8-FF19-4248-A4A0-1C9093B41962}" type="datetimeFigureOut">
               <a:rPr lang="en-US" smtClean="0"/>
-              <a:t>1/25/2020</a:t>
+              <a:t>3/4/2020</a:t>
             </a:fld>
             <a:endParaRPr lang="en-US"/>
           </a:p>
@@ -1731,7 +1732,7 @@
           <a:p>
             <a:fld id="{1C95C1E8-FF19-4248-A4A0-1C9093B41962}" type="datetimeFigureOut">
               <a:rPr lang="en-US" smtClean="0"/>
-              <a:t>1/25/2020</a:t>
+              <a:t>3/4/2020</a:t>
             </a:fld>
             <a:endParaRPr lang="en-US"/>
           </a:p>
@@ -1826,7 +1827,7 @@
           <a:p>
             <a:fld id="{1C95C1E8-FF19-4248-A4A0-1C9093B41962}" type="datetimeFigureOut">
               <a:rPr lang="en-US" smtClean="0"/>
-              <a:t>1/25/2020</a:t>
+              <a:t>3/4/2020</a:t>
             </a:fld>
             <a:endParaRPr lang="en-US"/>
           </a:p>
@@ -2103,7 +2104,7 @@
           <a:p>
             <a:fld id="{1C95C1E8-FF19-4248-A4A0-1C9093B41962}" type="datetimeFigureOut">
               <a:rPr lang="en-US" smtClean="0"/>
-              <a:t>1/25/2020</a:t>
+              <a:t>3/4/2020</a:t>
             </a:fld>
             <a:endParaRPr lang="en-US"/>
           </a:p>
@@ -2356,7 +2357,7 @@
           <a:p>
             <a:fld id="{1C95C1E8-FF19-4248-A4A0-1C9093B41962}" type="datetimeFigureOut">
               <a:rPr lang="en-US" smtClean="0"/>
-              <a:t>1/25/2020</a:t>
+              <a:t>3/4/2020</a:t>
             </a:fld>
             <a:endParaRPr lang="en-US"/>
           </a:p>
@@ -2569,7 +2570,7 @@
           <a:p>
             <a:fld id="{1C95C1E8-FF19-4248-A4A0-1C9093B41962}" type="datetimeFigureOut">
               <a:rPr lang="en-US" smtClean="0"/>
-              <a:t>1/25/2020</a:t>
+              <a:t>3/4/2020</a:t>
             </a:fld>
             <a:endParaRPr lang="en-US"/>
           </a:p>
@@ -3016,14 +3017,14 @@
           <a:p>
             <a:pPr algn="ctr"/>
             <a:r>
-              <a:rPr lang="en-US" sz="1801" dirty="0"/>
+              <a:rPr lang="en-US" b="1" dirty="0"/>
               <a:t>Transformation Instruction </a:t>
             </a:r>
             <a:r>
-              <a:rPr lang="en-US" sz="1801" dirty="0" smtClean="0"/>
+              <a:rPr lang="en-US" b="1" dirty="0" smtClean="0"/>
               <a:t>Set</a:t>
             </a:r>
-            <a:endParaRPr lang="en-US" sz="1801" dirty="0"/>
+            <a:endParaRPr lang="en-US" b="1" dirty="0"/>
           </a:p>
         </p:txBody>
       </p:sp>
@@ -3035,8 +3036,8 @@
         </p:nvSpPr>
         <p:spPr>
           <a:xfrm>
-            <a:off x="697513" y="3885567"/>
-            <a:ext cx="1325619" cy="646331"/>
+            <a:off x="720206" y="3613317"/>
+            <a:ext cx="1326582" cy="1107996"/>
           </a:xfrm>
           <a:prstGeom prst="rect">
             <a:avLst/>
@@ -3050,54 +3051,22 @@
           <a:lstStyle/>
           <a:p>
             <a:r>
-              <a:rPr lang="en-US" dirty="0" smtClean="0"/>
+              <a:rPr lang="en-US" sz="2200" b="1" dirty="0" smtClean="0"/>
               <a:t>Semantic </a:t>
             </a:r>
           </a:p>
           <a:p>
             <a:r>
-              <a:rPr lang="en-US" dirty="0" smtClean="0"/>
-              <a:t>Transformer</a:t>
-            </a:r>
-            <a:endParaRPr lang="en-US" dirty="0"/>
-          </a:p>
-        </p:txBody>
-      </p:sp>
-      <p:sp>
-        <p:nvSpPr>
-          <p:cNvPr id="12" name="TextBox 11"/>
-          <p:cNvSpPr txBox="1"/>
-          <p:nvPr/>
-        </p:nvSpPr>
-        <p:spPr>
-          <a:xfrm>
-            <a:off x="283124" y="227992"/>
-            <a:ext cx="4422429" cy="369332"/>
-          </a:xfrm>
-          <a:prstGeom prst="rect">
-            <a:avLst/>
-          </a:prstGeom>
-          <a:noFill/>
-        </p:spPr>
-        <p:txBody>
-          <a:bodyPr wrap="none" rtlCol="0">
-            <a:spAutoFit/>
-          </a:bodyPr>
-          <a:lstStyle/>
-          <a:p>
-            <a:r>
-              <a:rPr lang="en-US" dirty="0" smtClean="0"/>
-              <a:t>Fig </a:t>
-            </a:r>
-            <a:r>
-              <a:rPr lang="en-US" dirty="0"/>
-              <a:t>1</a:t>
-            </a:r>
-            <a:r>
-              <a:rPr lang="en-US" dirty="0" smtClean="0"/>
-              <a:t>. Generic Pipeline Architecture Overview</a:t>
-            </a:r>
-            <a:endParaRPr lang="en-US" dirty="0"/>
+              <a:rPr lang="en-US" sz="2200" b="1" dirty="0" smtClean="0"/>
+              <a:t>Engine </a:t>
+            </a:r>
+          </a:p>
+          <a:p>
+            <a:r>
+              <a:rPr lang="en-US" sz="2200" b="1" dirty="0" smtClean="0"/>
+              <a:t>Language</a:t>
+            </a:r>
+            <a:endParaRPr lang="en-US" sz="2200" b="1" dirty="0"/>
           </a:p>
         </p:txBody>
       </p:sp>
@@ -3143,10 +3112,10 @@
           <a:p>
             <a:pPr algn="ctr"/>
             <a:r>
-              <a:rPr lang="en-US" sz="1801" dirty="0" smtClean="0"/>
+              <a:rPr lang="en-US" sz="2100" b="1" dirty="0" smtClean="0"/>
               <a:t>Graph Specification</a:t>
             </a:r>
-            <a:endParaRPr lang="en-US" sz="1801" dirty="0"/>
+            <a:endParaRPr lang="en-US" sz="2100" b="1" dirty="0"/>
           </a:p>
         </p:txBody>
       </p:sp>
@@ -3192,10 +3161,18 @@
           <a:p>
             <a:pPr algn="ctr"/>
             <a:r>
-              <a:rPr lang="en-US" sz="1801" dirty="0" smtClean="0"/>
-              <a:t>Semantic Transformer Ontology</a:t>
-            </a:r>
-            <a:endParaRPr lang="en-US" sz="1801" dirty="0"/>
+              <a:rPr lang="en-US" b="1" dirty="0" smtClean="0"/>
+              <a:t>Semantic </a:t>
+            </a:r>
+            <a:r>
+              <a:rPr lang="en-US" b="1" dirty="0" smtClean="0"/>
+              <a:t>Engine Language </a:t>
+            </a:r>
+            <a:r>
+              <a:rPr lang="en-US" b="1" dirty="0" smtClean="0"/>
+              <a:t>Ontology</a:t>
+            </a:r>
+            <a:endParaRPr lang="en-US" b="1" dirty="0"/>
           </a:p>
         </p:txBody>
       </p:sp>
@@ -3207,7 +3184,7 @@
         </p:nvSpPr>
         <p:spPr>
           <a:xfrm>
-            <a:off x="9203316" y="1101868"/>
+            <a:off x="9366045" y="1139930"/>
             <a:ext cx="2325189" cy="1541417"/>
           </a:xfrm>
           <a:prstGeom prst="rect">
@@ -3244,34 +3221,14 @@
           <a:p>
             <a:pPr algn="ctr"/>
             <a:r>
-              <a:rPr lang="en-US" sz="1801" dirty="0" smtClean="0"/>
+              <a:rPr lang="en-US" sz="2200" b="1" dirty="0" smtClean="0"/>
               <a:t>RDF </a:t>
             </a:r>
             <a:r>
-              <a:rPr lang="en-US" sz="1801" dirty="0" err="1" smtClean="0"/>
+              <a:rPr lang="en-US" sz="2200" b="1" dirty="0" err="1" smtClean="0"/>
               <a:t>Triplestore</a:t>
             </a:r>
-            <a:r>
-              <a:rPr lang="en-US" sz="1801" dirty="0" smtClean="0"/>
-              <a:t> (</a:t>
-            </a:r>
-            <a:r>
-              <a:rPr lang="en-US" sz="1801" dirty="0" err="1" smtClean="0"/>
-              <a:t>Ontotext</a:t>
-            </a:r>
-            <a:r>
-              <a:rPr lang="en-US" sz="1801" dirty="0" smtClean="0"/>
-              <a:t> </a:t>
-            </a:r>
-            <a:r>
-              <a:rPr lang="en-US" sz="1801" dirty="0" err="1" smtClean="0"/>
-              <a:t>GraphDB</a:t>
-            </a:r>
-            <a:r>
-              <a:rPr lang="en-US" sz="1801" dirty="0" smtClean="0"/>
-              <a:t>)</a:t>
-            </a:r>
-            <a:endParaRPr lang="en-US" sz="1801" dirty="0"/>
+            <a:endParaRPr lang="en-US" sz="2200" b="1" dirty="0"/>
           </a:p>
         </p:txBody>
       </p:sp>
@@ -3353,10 +3310,10 @@
           <a:p>
             <a:pPr algn="ctr"/>
             <a:r>
-              <a:rPr lang="en-US" sz="1801" dirty="0" smtClean="0"/>
-              <a:t>Transformation Interpreter</a:t>
-            </a:r>
-            <a:endParaRPr lang="en-US" sz="1801" dirty="0"/>
+              <a:rPr lang="en-US" sz="2200" b="1" dirty="0" smtClean="0"/>
+              <a:t>Semantic Engine</a:t>
+            </a:r>
+            <a:endParaRPr lang="en-US" sz="2200" b="1" dirty="0"/>
           </a:p>
         </p:txBody>
       </p:sp>
@@ -3368,7 +3325,7 @@
         </p:nvSpPr>
         <p:spPr>
           <a:xfrm>
-            <a:off x="536969" y="3238474"/>
+            <a:off x="536969" y="3272202"/>
             <a:ext cx="4062953" cy="3214865"/>
           </a:xfrm>
           <a:prstGeom prst="rect">
@@ -3449,14 +3406,14 @@
           <a:p>
             <a:pPr algn="ctr"/>
             <a:r>
-              <a:rPr lang="en-US" dirty="0" smtClean="0">
+              <a:rPr lang="en-US" b="1" dirty="0" smtClean="0">
                 <a:solidFill>
                   <a:schemeClr val="tx1"/>
                 </a:solidFill>
               </a:rPr>
               <a:t>Set of SPARQL Update Statements</a:t>
             </a:r>
-            <a:endParaRPr lang="en-US" dirty="0">
+            <a:endParaRPr lang="en-US" b="1" dirty="0">
               <a:solidFill>
                 <a:schemeClr val="tx1"/>
               </a:solidFill>
@@ -3508,7 +3465,7 @@
         </p:nvCxnSpPr>
         <p:spPr>
           <a:xfrm flipV="1">
-            <a:off x="10383996" y="2643285"/>
+            <a:off x="10481310" y="2681347"/>
             <a:ext cx="0" cy="1439808"/>
           </a:xfrm>
           <a:prstGeom prst="straightConnector1">
@@ -3578,14 +3535,14 @@
           <a:p>
             <a:pPr algn="ctr"/>
             <a:r>
-              <a:rPr lang="en-US" sz="1801" dirty="0" smtClean="0">
+              <a:rPr lang="en-US" sz="2200" b="1" dirty="0" smtClean="0">
                 <a:solidFill>
                   <a:schemeClr val="tx1"/>
                 </a:solidFill>
               </a:rPr>
               <a:t>Data sources (relational DB, property graph, CSV file, etc.)</a:t>
             </a:r>
-            <a:endParaRPr lang="en-US" sz="1801" dirty="0">
+            <a:endParaRPr lang="en-US" sz="2200" b="1" dirty="0">
               <a:solidFill>
                 <a:schemeClr val="tx1"/>
               </a:solidFill>
@@ -3593,39 +3550,6 @@
           </a:p>
         </p:txBody>
       </p:sp>
-      <p:cxnSp>
-        <p:nvCxnSpPr>
-          <p:cNvPr id="40" name="Straight Arrow Connector 39"/>
-          <p:cNvCxnSpPr/>
-          <p:nvPr/>
-        </p:nvCxnSpPr>
-        <p:spPr>
-          <a:xfrm flipV="1">
-            <a:off x="5896690" y="1853795"/>
-            <a:ext cx="572083" cy="18782"/>
-          </a:xfrm>
-          <a:prstGeom prst="straightConnector1">
-            <a:avLst/>
-          </a:prstGeom>
-          <a:ln>
-            <a:tailEnd type="triangle"/>
-          </a:ln>
-        </p:spPr>
-        <p:style>
-          <a:lnRef idx="1">
-            <a:schemeClr val="accent1"/>
-          </a:lnRef>
-          <a:fillRef idx="0">
-            <a:schemeClr val="accent1"/>
-          </a:fillRef>
-          <a:effectRef idx="0">
-            <a:schemeClr val="accent1"/>
-          </a:effectRef>
-          <a:fontRef idx="minor">
-            <a:schemeClr val="tx1"/>
-          </a:fontRef>
-        </p:style>
-      </p:cxnSp>
       <p:cxnSp>
         <p:nvCxnSpPr>
           <p:cNvPr id="44" name="Straight Arrow Connector 43"/>
@@ -3706,10 +3630,10 @@
           <a:p>
             <a:pPr algn="ctr"/>
             <a:r>
-              <a:rPr lang="en-US" sz="1801" dirty="0" smtClean="0"/>
+              <a:rPr lang="en-US" sz="2200" b="1" dirty="0" smtClean="0"/>
               <a:t>Data Aggregator Service</a:t>
             </a:r>
-            <a:endParaRPr lang="en-US" sz="1801" dirty="0"/>
+            <a:endParaRPr lang="en-US" sz="2200" b="1" dirty="0"/>
           </a:p>
         </p:txBody>
       </p:sp>
@@ -3758,14 +3682,14 @@
           <a:p>
             <a:pPr algn="ctr"/>
             <a:r>
-              <a:rPr lang="en-US" sz="1801" dirty="0" smtClean="0">
+              <a:rPr lang="en-US" sz="2200" b="1" dirty="0" smtClean="0">
                 <a:solidFill>
                   <a:schemeClr val="tx1"/>
                 </a:solidFill>
               </a:rPr>
               <a:t>RDF data formatted with domain-specific schema</a:t>
             </a:r>
-            <a:endParaRPr lang="en-US" sz="1801" dirty="0">
+            <a:endParaRPr lang="en-US" sz="2200" b="1" dirty="0">
               <a:solidFill>
                 <a:schemeClr val="tx1"/>
               </a:solidFill>
@@ -3775,16 +3699,47 @@
       </p:sp>
       <p:cxnSp>
         <p:nvCxnSpPr>
-          <p:cNvPr id="56" name="Straight Arrow Connector 55"/>
-          <p:cNvCxnSpPr>
-            <a:endCxn id="18" idx="1"/>
-          </p:cNvCxnSpPr>
+          <p:cNvPr id="22" name="Straight Arrow Connector 21"/>
+          <p:cNvCxnSpPr/>
           <p:nvPr/>
         </p:nvCxnSpPr>
         <p:spPr>
           <a:xfrm flipV="1">
-            <a:off x="8774620" y="1872577"/>
-            <a:ext cx="428696" cy="18781"/>
+            <a:off x="5896690" y="1900265"/>
+            <a:ext cx="604837" cy="1"/>
+          </a:xfrm>
+          <a:prstGeom prst="straightConnector1">
+            <a:avLst/>
+          </a:prstGeom>
+          <a:ln>
+            <a:tailEnd type="triangle"/>
+          </a:ln>
+        </p:spPr>
+        <p:style>
+          <a:lnRef idx="1">
+            <a:schemeClr val="accent1"/>
+          </a:lnRef>
+          <a:fillRef idx="0">
+            <a:schemeClr val="accent1"/>
+          </a:fillRef>
+          <a:effectRef idx="0">
+            <a:schemeClr val="accent1"/>
+          </a:effectRef>
+          <a:fontRef idx="minor">
+            <a:schemeClr val="tx1"/>
+          </a:fontRef>
+        </p:style>
+      </p:cxnSp>
+      <p:cxnSp>
+        <p:nvCxnSpPr>
+          <p:cNvPr id="24" name="Straight Arrow Connector 23"/>
+          <p:cNvCxnSpPr/>
+          <p:nvPr/>
+        </p:nvCxnSpPr>
+        <p:spPr>
+          <a:xfrm flipV="1">
+            <a:off x="8793962" y="1949374"/>
+            <a:ext cx="604837" cy="1"/>
           </a:xfrm>
           <a:prstGeom prst="straightConnector1">
             <a:avLst/>
@@ -3846,8 +3801,8 @@
         </p:nvSpPr>
         <p:spPr>
           <a:xfrm>
-            <a:off x="5142415" y="4241076"/>
-            <a:ext cx="2325189" cy="1541417"/>
+            <a:off x="4154956" y="2495404"/>
+            <a:ext cx="2569028" cy="1823723"/>
           </a:xfrm>
           <a:prstGeom prst="rect">
             <a:avLst/>
@@ -3881,16 +3836,15 @@
           </a:bodyPr>
           <a:lstStyle/>
           <a:p>
-            <a:pPr algn="ctr"/>
-            <a:r>
-              <a:rPr lang="en-US" sz="1801" dirty="0" smtClean="0">
+            <a:r>
+              <a:rPr lang="en-US" sz="2200" b="1" dirty="0" smtClean="0">
                 <a:solidFill>
                   <a:schemeClr val="tx1"/>
                 </a:solidFill>
               </a:rPr>
-              <a:t>Carnival (data aggregator)</a:t>
-            </a:r>
-            <a:endParaRPr lang="en-US" sz="1801" dirty="0">
+              <a:t>Data Aggregator (Carnival)</a:t>
+            </a:r>
+            <a:endParaRPr lang="en-US" sz="2200" b="1" dirty="0">
               <a:solidFill>
                 <a:schemeClr val="tx1"/>
               </a:solidFill>
@@ -3902,14 +3856,14 @@
         <p:nvCxnSpPr>
           <p:cNvPr id="10" name="Straight Arrow Connector 9"/>
           <p:cNvCxnSpPr>
-            <a:endCxn id="7" idx="1"/>
+            <a:stCxn id="18" idx="3"/>
           </p:cNvCxnSpPr>
           <p:nvPr/>
         </p:nvCxnSpPr>
         <p:spPr>
           <a:xfrm>
-            <a:off x="3707681" y="2248995"/>
-            <a:ext cx="1434734" cy="2762790"/>
+            <a:off x="2978871" y="1150927"/>
+            <a:ext cx="1176085" cy="1893931"/>
           </a:xfrm>
           <a:prstGeom prst="straightConnector1">
             <a:avLst/>
@@ -3944,8 +3898,8 @@
         </p:nvCxnSpPr>
         <p:spPr>
           <a:xfrm>
-            <a:off x="3707681" y="5011785"/>
-            <a:ext cx="1434734" cy="0"/>
+            <a:off x="3063712" y="3405753"/>
+            <a:ext cx="1091244" cy="1513"/>
           </a:xfrm>
           <a:prstGeom prst="straightConnector1">
             <a:avLst/>
@@ -3979,8 +3933,8 @@
         </p:nvCxnSpPr>
         <p:spPr>
           <a:xfrm flipV="1">
-            <a:off x="7467604" y="5000899"/>
-            <a:ext cx="796833" cy="10886"/>
+            <a:off x="6723984" y="3405753"/>
+            <a:ext cx="824013" cy="1513"/>
           </a:xfrm>
           <a:prstGeom prst="straightConnector1">
             <a:avLst/>
@@ -4006,20 +3960,22 @@
       </p:cxnSp>
       <p:sp>
         <p:nvSpPr>
-          <p:cNvPr id="16" name="Rectangle 15"/>
+          <p:cNvPr id="15" name="Rounded Rectangle 14"/>
           <p:cNvSpPr/>
           <p:nvPr/>
         </p:nvSpPr>
         <p:spPr>
           <a:xfrm>
-            <a:off x="8264437" y="4241076"/>
-            <a:ext cx="2325189" cy="1541417"/>
-          </a:xfrm>
-          <a:prstGeom prst="rect">
+            <a:off x="7547997" y="248828"/>
+            <a:ext cx="2569028" cy="1898468"/>
+          </a:xfrm>
+          <a:prstGeom prst="roundRect">
             <a:avLst/>
           </a:prstGeom>
           <a:solidFill>
-            <a:schemeClr val="accent6"/>
+            <a:schemeClr val="accent4">
+              <a:lumMod val="75000"/>
+            </a:schemeClr>
           </a:solidFill>
         </p:spPr>
         <p:style>
@@ -4049,153 +4005,29 @@
           <a:p>
             <a:pPr algn="ctr"/>
             <a:r>
-              <a:rPr lang="en-US" sz="1801" dirty="0" smtClean="0"/>
-              <a:t>RDF </a:t>
-            </a:r>
-            <a:r>
-              <a:rPr lang="en-US" sz="1801" dirty="0" err="1" smtClean="0"/>
-              <a:t>Triplestore</a:t>
-            </a:r>
-            <a:r>
-              <a:rPr lang="en-US" sz="1801" dirty="0" smtClean="0"/>
-              <a:t> (</a:t>
-            </a:r>
-            <a:r>
-              <a:rPr lang="en-US" sz="1801" dirty="0" err="1" smtClean="0"/>
-              <a:t>Ontotext</a:t>
-            </a:r>
-            <a:r>
-              <a:rPr lang="en-US" sz="1801" dirty="0" smtClean="0"/>
-              <a:t> </a:t>
-            </a:r>
-            <a:r>
-              <a:rPr lang="en-US" sz="1801" dirty="0" err="1" smtClean="0"/>
-              <a:t>GraphDB</a:t>
-            </a:r>
-            <a:r>
-              <a:rPr lang="en-US" sz="1801" dirty="0" smtClean="0"/>
-              <a:t>)</a:t>
-            </a:r>
-            <a:endParaRPr lang="en-US" sz="1801" dirty="0"/>
-          </a:p>
-        </p:txBody>
-      </p:sp>
-      <p:cxnSp>
-        <p:nvCxnSpPr>
-          <p:cNvPr id="25" name="Straight Arrow Connector 24"/>
-          <p:cNvCxnSpPr>
-            <a:endCxn id="16" idx="0"/>
-          </p:cNvCxnSpPr>
-          <p:nvPr/>
-        </p:nvCxnSpPr>
-        <p:spPr>
-          <a:xfrm>
-            <a:off x="9427032" y="2991402"/>
-            <a:ext cx="0" cy="1249674"/>
-          </a:xfrm>
-          <a:prstGeom prst="straightConnector1">
-            <a:avLst/>
-          </a:prstGeom>
-          <a:ln>
-            <a:tailEnd type="triangle"/>
-          </a:ln>
-        </p:spPr>
-        <p:style>
-          <a:lnRef idx="1">
-            <a:schemeClr val="accent1"/>
-          </a:lnRef>
-          <a:fillRef idx="0">
-            <a:schemeClr val="accent1"/>
-          </a:fillRef>
-          <a:effectRef idx="0">
-            <a:schemeClr val="accent1"/>
-          </a:effectRef>
-          <a:fontRef idx="minor">
-            <a:schemeClr val="tx1"/>
-          </a:fontRef>
-        </p:style>
-      </p:cxnSp>
-      <p:sp>
-        <p:nvSpPr>
-          <p:cNvPr id="28" name="TextBox 27"/>
-          <p:cNvSpPr txBox="1"/>
-          <p:nvPr/>
-        </p:nvSpPr>
-        <p:spPr>
-          <a:xfrm>
-            <a:off x="396246" y="374468"/>
-            <a:ext cx="3504998" cy="369332"/>
-          </a:xfrm>
-          <a:prstGeom prst="rect">
-            <a:avLst/>
-          </a:prstGeom>
-          <a:noFill/>
-        </p:spPr>
-        <p:txBody>
-          <a:bodyPr wrap="none" rtlCol="0">
-            <a:spAutoFit/>
-          </a:bodyPr>
-          <a:lstStyle/>
-          <a:p>
-            <a:r>
-              <a:rPr lang="en-US" dirty="0" smtClean="0"/>
-              <a:t>Fig 2. Carnival Pipeline Architecture</a:t>
-            </a:r>
-            <a:endParaRPr lang="en-US" dirty="0"/>
-          </a:p>
-        </p:txBody>
-      </p:sp>
-      <p:cxnSp>
-        <p:nvCxnSpPr>
-          <p:cNvPr id="14" name="Straight Arrow Connector 13"/>
-          <p:cNvCxnSpPr/>
-          <p:nvPr/>
-        </p:nvCxnSpPr>
-        <p:spPr>
-          <a:xfrm>
-            <a:off x="7426239" y="2042169"/>
-            <a:ext cx="607422" cy="0"/>
-          </a:xfrm>
-          <a:prstGeom prst="straightConnector1">
-            <a:avLst/>
-          </a:prstGeom>
-          <a:ln>
-            <a:tailEnd type="triangle"/>
-          </a:ln>
-        </p:spPr>
-        <p:style>
-          <a:lnRef idx="1">
-            <a:schemeClr val="accent1"/>
-          </a:lnRef>
-          <a:fillRef idx="0">
-            <a:schemeClr val="accent1"/>
-          </a:fillRef>
-          <a:effectRef idx="0">
-            <a:schemeClr val="accent1"/>
-          </a:effectRef>
-          <a:fontRef idx="minor">
-            <a:schemeClr val="tx1"/>
-          </a:fontRef>
-        </p:style>
-      </p:cxnSp>
-      <p:sp>
-        <p:nvSpPr>
-          <p:cNvPr id="15" name="Rounded Rectangle 14"/>
+              <a:rPr lang="en-US" sz="2200" b="1" dirty="0" smtClean="0"/>
+              <a:t>Semantic Engine Language</a:t>
+            </a:r>
+            <a:endParaRPr lang="en-US" sz="2200" b="1" dirty="0"/>
+          </a:p>
+        </p:txBody>
+      </p:sp>
+      <p:sp>
+        <p:nvSpPr>
+          <p:cNvPr id="17" name="Rounded Rectangle 16"/>
           <p:cNvSpPr/>
           <p:nvPr/>
         </p:nvSpPr>
         <p:spPr>
           <a:xfrm>
-            <a:off x="4870274" y="1092934"/>
+            <a:off x="4154956" y="239066"/>
             <a:ext cx="2569028" cy="1898468"/>
           </a:xfrm>
           <a:prstGeom prst="roundRect">
             <a:avLst/>
           </a:prstGeom>
           <a:solidFill>
-            <a:schemeClr val="accent4">
-              <a:lumMod val="75000"/>
-            </a:schemeClr>
+            <a:srgbClr val="7030A0"/>
           </a:solidFill>
         </p:spPr>
         <p:style>
@@ -4225,29 +4057,29 @@
           <a:p>
             <a:pPr algn="ctr"/>
             <a:r>
-              <a:rPr lang="en-US" sz="1801" dirty="0" smtClean="0"/>
-              <a:t>Semantic Transformer</a:t>
-            </a:r>
-            <a:endParaRPr lang="en-US" sz="1801" dirty="0"/>
-          </a:p>
-        </p:txBody>
-      </p:sp>
-      <p:sp>
-        <p:nvSpPr>
-          <p:cNvPr id="17" name="Rounded Rectangle 16"/>
+              <a:rPr lang="en-US" sz="2200" b="1" dirty="0" smtClean="0"/>
+              <a:t>Semantic Engine</a:t>
+            </a:r>
+            <a:endParaRPr lang="en-US" sz="2200" b="1" dirty="0"/>
+          </a:p>
+        </p:txBody>
+      </p:sp>
+      <p:sp>
+        <p:nvSpPr>
+          <p:cNvPr id="18" name="Rectangle 17"/>
           <p:cNvSpPr/>
           <p:nvPr/>
         </p:nvSpPr>
         <p:spPr>
           <a:xfrm>
-            <a:off x="8020598" y="1092934"/>
-            <a:ext cx="2569028" cy="1898468"/>
-          </a:xfrm>
-          <a:prstGeom prst="roundRect">
+            <a:off x="429993" y="322225"/>
+            <a:ext cx="2548878" cy="1657404"/>
+          </a:xfrm>
+          <a:prstGeom prst="rect">
             <a:avLst/>
           </a:prstGeom>
           <a:solidFill>
-            <a:srgbClr val="7030A0"/>
+            <a:srgbClr val="FF0000"/>
           </a:solidFill>
         </p:spPr>
         <p:style>
@@ -4275,25 +4107,40 @@
           </a:bodyPr>
           <a:lstStyle/>
           <a:p>
-            <a:pPr algn="ctr"/>
-            <a:r>
-              <a:rPr lang="en-US" sz="1801" dirty="0" smtClean="0"/>
-              <a:t>Transformation Interpreter</a:t>
-            </a:r>
-            <a:endParaRPr lang="en-US" sz="1801" dirty="0"/>
-          </a:p>
-        </p:txBody>
-      </p:sp>
-      <p:sp>
-        <p:nvSpPr>
-          <p:cNvPr id="18" name="Rectangle 17"/>
+            <a:r>
+              <a:rPr lang="en-US" sz="2200" b="1" dirty="0">
+                <a:solidFill>
+                  <a:schemeClr val="tx1"/>
+                </a:solidFill>
+              </a:rPr>
+              <a:t>Penn Data </a:t>
+            </a:r>
+            <a:r>
+              <a:rPr lang="en-US" sz="2200" b="1" dirty="0" smtClean="0">
+                <a:solidFill>
+                  <a:schemeClr val="tx1"/>
+                </a:solidFill>
+              </a:rPr>
+              <a:t>Store</a:t>
+            </a:r>
+            <a:endParaRPr lang="en-US" sz="2200" b="1" dirty="0">
+              <a:solidFill>
+                <a:schemeClr val="tx1"/>
+              </a:solidFill>
+            </a:endParaRPr>
+          </a:p>
+        </p:txBody>
+      </p:sp>
+      <p:sp>
+        <p:nvSpPr>
+          <p:cNvPr id="19" name="Rectangle 18"/>
           <p:cNvSpPr/>
           <p:nvPr/>
         </p:nvSpPr>
         <p:spPr>
           <a:xfrm>
-            <a:off x="1382492" y="1449985"/>
-            <a:ext cx="2325189" cy="1541417"/>
+            <a:off x="429992" y="2577220"/>
+            <a:ext cx="2633720" cy="1657066"/>
           </a:xfrm>
           <a:prstGeom prst="rect">
             <a:avLst/>
@@ -4327,34 +4174,288 @@
           </a:bodyPr>
           <a:lstStyle/>
           <a:p>
-            <a:pPr algn="ctr"/>
-            <a:r>
-              <a:rPr lang="en-US" sz="1801" dirty="0">
+            <a:r>
+              <a:rPr lang="en-US" sz="2200" b="1" dirty="0" smtClean="0">
                 <a:solidFill>
                   <a:schemeClr val="tx1"/>
                 </a:solidFill>
               </a:rPr>
-              <a:t>Penn Data Store (patient demographics, diagnoses, medications, etc.)</a:t>
-            </a:r>
-          </a:p>
-        </p:txBody>
-      </p:sp>
-      <p:sp>
-        <p:nvSpPr>
-          <p:cNvPr id="19" name="Rectangle 18"/>
+              <a:t>Loss of Gene Function Mutation </a:t>
+            </a:r>
+            <a:r>
+              <a:rPr lang="en-US" sz="2200" b="1" dirty="0" smtClean="0">
+                <a:solidFill>
+                  <a:schemeClr val="tx1"/>
+                </a:solidFill>
+              </a:rPr>
+              <a:t>CSV File</a:t>
+            </a:r>
+            <a:endParaRPr lang="en-US" sz="2200" b="1" dirty="0">
+              <a:solidFill>
+                <a:schemeClr val="tx1"/>
+              </a:solidFill>
+            </a:endParaRPr>
+          </a:p>
+        </p:txBody>
+      </p:sp>
+      <p:cxnSp>
+        <p:nvCxnSpPr>
+          <p:cNvPr id="50" name="Straight Arrow Connector 49"/>
+          <p:cNvCxnSpPr>
+            <a:endCxn id="15" idx="1"/>
+          </p:cNvCxnSpPr>
+          <p:nvPr/>
+        </p:nvCxnSpPr>
+        <p:spPr>
+          <a:xfrm flipV="1">
+            <a:off x="6597754" y="1198062"/>
+            <a:ext cx="950243" cy="1514"/>
+          </a:xfrm>
+          <a:prstGeom prst="straightConnector1">
+            <a:avLst/>
+          </a:prstGeom>
+          <a:ln>
+            <a:tailEnd type="triangle"/>
+          </a:ln>
+        </p:spPr>
+        <p:style>
+          <a:lnRef idx="1">
+            <a:schemeClr val="accent1"/>
+          </a:lnRef>
+          <a:fillRef idx="0">
+            <a:schemeClr val="accent1"/>
+          </a:fillRef>
+          <a:effectRef idx="0">
+            <a:schemeClr val="accent1"/>
+          </a:effectRef>
+          <a:fontRef idx="minor">
+            <a:schemeClr val="tx1"/>
+          </a:fontRef>
+        </p:style>
+      </p:cxnSp>
+      <p:cxnSp>
+        <p:nvCxnSpPr>
+          <p:cNvPr id="52" name="Straight Arrow Connector 51"/>
+          <p:cNvCxnSpPr/>
+          <p:nvPr/>
+        </p:nvCxnSpPr>
+        <p:spPr>
+          <a:xfrm flipH="1">
+            <a:off x="8946037" y="2147296"/>
+            <a:ext cx="9427" cy="482844"/>
+          </a:xfrm>
+          <a:prstGeom prst="straightConnector1">
+            <a:avLst/>
+          </a:prstGeom>
+          <a:ln>
+            <a:tailEnd type="triangle"/>
+          </a:ln>
+        </p:spPr>
+        <p:style>
+          <a:lnRef idx="1">
+            <a:schemeClr val="accent1"/>
+          </a:lnRef>
+          <a:fillRef idx="0">
+            <a:schemeClr val="accent1"/>
+          </a:fillRef>
+          <a:effectRef idx="0">
+            <a:schemeClr val="accent1"/>
+          </a:effectRef>
+          <a:fontRef idx="minor">
+            <a:schemeClr val="tx1"/>
+          </a:fontRef>
+        </p:style>
+      </p:cxnSp>
+      <p:sp>
+        <p:nvSpPr>
+          <p:cNvPr id="59" name="Oval 58"/>
           <p:cNvSpPr/>
           <p:nvPr/>
         </p:nvSpPr>
         <p:spPr>
           <a:xfrm>
-            <a:off x="1382492" y="4241076"/>
-            <a:ext cx="2325189" cy="1541417"/>
+            <a:off x="2225554" y="1246205"/>
+            <a:ext cx="753317" cy="733424"/>
+          </a:xfrm>
+          <a:prstGeom prst="ellipse">
+            <a:avLst/>
+          </a:prstGeom>
+          <a:solidFill>
+            <a:schemeClr val="accent4">
+              <a:lumMod val="60000"/>
+              <a:lumOff val="40000"/>
+            </a:schemeClr>
+          </a:solidFill>
+        </p:spPr>
+        <p:style>
+          <a:lnRef idx="2">
+            <a:schemeClr val="accent1">
+              <a:shade val="50000"/>
+            </a:schemeClr>
+          </a:lnRef>
+          <a:fillRef idx="1">
+            <a:schemeClr val="accent1"/>
+          </a:fillRef>
+          <a:effectRef idx="0">
+            <a:schemeClr val="accent1"/>
+          </a:effectRef>
+          <a:fontRef idx="minor">
+            <a:schemeClr val="lt1"/>
+          </a:fontRef>
+        </p:style>
+        <p:txBody>
+          <a:bodyPr rtlCol="0" anchor="ctr"/>
+          <a:lstStyle/>
+          <a:p>
+            <a:pPr algn="ctr"/>
+            <a:r>
+              <a:rPr lang="en-US" dirty="0" smtClean="0">
+                <a:solidFill>
+                  <a:schemeClr val="tx1"/>
+                </a:solidFill>
+              </a:rPr>
+              <a:t>1</a:t>
+            </a:r>
+            <a:endParaRPr lang="en-US" dirty="0">
+              <a:solidFill>
+                <a:schemeClr val="tx1"/>
+              </a:solidFill>
+            </a:endParaRPr>
+          </a:p>
+        </p:txBody>
+      </p:sp>
+      <p:sp>
+        <p:nvSpPr>
+          <p:cNvPr id="60" name="Oval 59"/>
+          <p:cNvSpPr/>
+          <p:nvPr/>
+        </p:nvSpPr>
+        <p:spPr>
+          <a:xfrm>
+            <a:off x="2310395" y="3500862"/>
+            <a:ext cx="753317" cy="733424"/>
+          </a:xfrm>
+          <a:prstGeom prst="ellipse">
+            <a:avLst/>
+          </a:prstGeom>
+          <a:solidFill>
+            <a:schemeClr val="accent4">
+              <a:lumMod val="60000"/>
+              <a:lumOff val="40000"/>
+            </a:schemeClr>
+          </a:solidFill>
+        </p:spPr>
+        <p:style>
+          <a:lnRef idx="2">
+            <a:schemeClr val="accent1">
+              <a:shade val="50000"/>
+            </a:schemeClr>
+          </a:lnRef>
+          <a:fillRef idx="1">
+            <a:schemeClr val="accent1"/>
+          </a:fillRef>
+          <a:effectRef idx="0">
+            <a:schemeClr val="accent1"/>
+          </a:effectRef>
+          <a:fontRef idx="minor">
+            <a:schemeClr val="lt1"/>
+          </a:fontRef>
+        </p:style>
+        <p:txBody>
+          <a:bodyPr rtlCol="0" anchor="ctr"/>
+          <a:lstStyle/>
+          <a:p>
+            <a:pPr algn="ctr"/>
+            <a:r>
+              <a:rPr lang="en-US" dirty="0" smtClean="0">
+                <a:solidFill>
+                  <a:schemeClr val="tx1"/>
+                </a:solidFill>
+              </a:rPr>
+              <a:t>1</a:t>
+            </a:r>
+            <a:endParaRPr lang="en-US" dirty="0">
+              <a:solidFill>
+                <a:schemeClr val="tx1"/>
+              </a:solidFill>
+            </a:endParaRPr>
+          </a:p>
+        </p:txBody>
+      </p:sp>
+      <p:sp>
+        <p:nvSpPr>
+          <p:cNvPr id="61" name="Oval 60"/>
+          <p:cNvSpPr/>
+          <p:nvPr/>
+        </p:nvSpPr>
+        <p:spPr>
+          <a:xfrm>
+            <a:off x="5970667" y="3584191"/>
+            <a:ext cx="753317" cy="733424"/>
+          </a:xfrm>
+          <a:prstGeom prst="ellipse">
+            <a:avLst/>
+          </a:prstGeom>
+          <a:solidFill>
+            <a:schemeClr val="accent4">
+              <a:lumMod val="60000"/>
+              <a:lumOff val="40000"/>
+            </a:schemeClr>
+          </a:solidFill>
+        </p:spPr>
+        <p:style>
+          <a:lnRef idx="2">
+            <a:schemeClr val="accent1">
+              <a:shade val="50000"/>
+            </a:schemeClr>
+          </a:lnRef>
+          <a:fillRef idx="1">
+            <a:schemeClr val="accent1"/>
+          </a:fillRef>
+          <a:effectRef idx="0">
+            <a:schemeClr val="accent1"/>
+          </a:effectRef>
+          <a:fontRef idx="minor">
+            <a:schemeClr val="lt1"/>
+          </a:fontRef>
+        </p:style>
+        <p:txBody>
+          <a:bodyPr rtlCol="0" anchor="ctr"/>
+          <a:lstStyle/>
+          <a:p>
+            <a:pPr algn="ctr"/>
+            <a:r>
+              <a:rPr lang="en-US" dirty="0">
+                <a:solidFill>
+                  <a:schemeClr val="tx1"/>
+                </a:solidFill>
+              </a:rPr>
+              <a:t>2</a:t>
+            </a:r>
+            <a:endParaRPr lang="en-US" dirty="0">
+              <a:solidFill>
+                <a:schemeClr val="tx1"/>
+              </a:solidFill>
+            </a:endParaRPr>
+          </a:p>
+        </p:txBody>
+      </p:sp>
+      <p:sp>
+        <p:nvSpPr>
+          <p:cNvPr id="64" name="Rectangle 63"/>
+          <p:cNvSpPr/>
+          <p:nvPr/>
+        </p:nvSpPr>
+        <p:spPr>
+          <a:xfrm>
+            <a:off x="7547997" y="2630140"/>
+            <a:ext cx="2447108" cy="1741444"/>
           </a:xfrm>
           <a:prstGeom prst="rect">
             <a:avLst/>
           </a:prstGeom>
           <a:solidFill>
-            <a:srgbClr val="FF0000"/>
+            <a:schemeClr val="accent6"/>
           </a:solidFill>
         </p:spPr>
         <p:style>
@@ -4382,16 +4483,88 @@
           </a:bodyPr>
           <a:lstStyle/>
           <a:p>
+            <a:r>
+              <a:rPr lang="en-US" sz="2200" b="1" dirty="0" smtClean="0"/>
+              <a:t>RDF </a:t>
+            </a:r>
+            <a:r>
+              <a:rPr lang="en-US" sz="2200" b="1" dirty="0" err="1" smtClean="0"/>
+              <a:t>Triplestore</a:t>
+            </a:r>
+            <a:r>
+              <a:rPr lang="en-US" sz="2200" b="1" dirty="0" smtClean="0"/>
+              <a:t> (</a:t>
+            </a:r>
+            <a:r>
+              <a:rPr lang="en-US" sz="2200" b="1" dirty="0" err="1" smtClean="0"/>
+              <a:t>Ontotext</a:t>
+            </a:r>
+            <a:endParaRPr lang="en-US" sz="2200" b="1" dirty="0" smtClean="0"/>
+          </a:p>
+          <a:p>
+            <a:r>
+              <a:rPr lang="en-US" sz="2200" b="1" dirty="0" err="1" smtClean="0"/>
+              <a:t>GraphDB</a:t>
+            </a:r>
+            <a:r>
+              <a:rPr lang="en-US" sz="2200" b="1" dirty="0" smtClean="0"/>
+              <a:t>)</a:t>
+            </a:r>
+            <a:endParaRPr lang="en-US" sz="2200" b="1" dirty="0"/>
+          </a:p>
+        </p:txBody>
+      </p:sp>
+      <p:sp>
+        <p:nvSpPr>
+          <p:cNvPr id="62" name="Oval 61"/>
+          <p:cNvSpPr/>
+          <p:nvPr/>
+        </p:nvSpPr>
+        <p:spPr>
+          <a:xfrm>
+            <a:off x="9241788" y="3638160"/>
+            <a:ext cx="753317" cy="733424"/>
+          </a:xfrm>
+          <a:prstGeom prst="ellipse">
+            <a:avLst/>
+          </a:prstGeom>
+          <a:solidFill>
+            <a:schemeClr val="accent4">
+              <a:lumMod val="60000"/>
+              <a:lumOff val="40000"/>
+            </a:schemeClr>
+          </a:solidFill>
+        </p:spPr>
+        <p:style>
+          <a:lnRef idx="2">
+            <a:schemeClr val="accent1">
+              <a:shade val="50000"/>
+            </a:schemeClr>
+          </a:lnRef>
+          <a:fillRef idx="1">
+            <a:schemeClr val="accent1"/>
+          </a:fillRef>
+          <a:effectRef idx="0">
+            <a:schemeClr val="accent1"/>
+          </a:effectRef>
+          <a:fontRef idx="minor">
+            <a:schemeClr val="lt1"/>
+          </a:fontRef>
+        </p:style>
+        <p:txBody>
+          <a:bodyPr rtlCol="0" anchor="ctr"/>
+          <a:lstStyle/>
+          <a:p>
             <a:pPr algn="ctr"/>
             <a:r>
-              <a:rPr lang="en-US" sz="1801" dirty="0" smtClean="0">
+              <a:rPr lang="en-US" dirty="0" smtClean="0">
                 <a:solidFill>
                   <a:schemeClr val="tx1"/>
                 </a:solidFill>
               </a:rPr>
-              <a:t>Loss of Gene Function Mutation Data</a:t>
-            </a:r>
-            <a:endParaRPr lang="en-US" sz="1801" dirty="0">
+              <a:t>3</a:t>
+            </a:r>
+            <a:endParaRPr lang="en-US" dirty="0">
               <a:solidFill>
                 <a:schemeClr val="tx1"/>
               </a:solidFill>
@@ -4444,7 +4617,7 @@
         </p:nvSpPr>
         <p:spPr>
           <a:xfrm>
-            <a:off x="3323109" y="1367246"/>
+            <a:off x="3445029" y="239210"/>
             <a:ext cx="2569028" cy="1898468"/>
           </a:xfrm>
           <a:prstGeom prst="roundRect">
@@ -4481,10 +4654,14 @@
           <a:p>
             <a:pPr algn="ctr"/>
             <a:r>
-              <a:rPr lang="en-US" sz="1801" dirty="0" smtClean="0"/>
-              <a:t>OMOP Conversion Tools</a:t>
-            </a:r>
-            <a:endParaRPr lang="en-US" sz="1801" dirty="0"/>
+              <a:rPr lang="en-US" sz="2200" b="1" dirty="0" smtClean="0"/>
+              <a:t>OHDSI ETL-</a:t>
+            </a:r>
+            <a:r>
+              <a:rPr lang="en-US" sz="2200" b="1" dirty="0" err="1" smtClean="0"/>
+              <a:t>Synthea</a:t>
+            </a:r>
+            <a:endParaRPr lang="en-US" sz="2200" b="1" dirty="0"/>
           </a:p>
         </p:txBody>
       </p:sp>
@@ -4496,8 +4673,8 @@
         </p:nvSpPr>
         <p:spPr>
           <a:xfrm>
-            <a:off x="3445029" y="4430482"/>
-            <a:ext cx="2325189" cy="1541417"/>
+            <a:off x="3560416" y="2778160"/>
+            <a:ext cx="2595775" cy="1789337"/>
           </a:xfrm>
           <a:prstGeom prst="rect">
             <a:avLst/>
@@ -4531,12 +4708,11 @@
           </a:bodyPr>
           <a:lstStyle/>
           <a:p>
-            <a:pPr algn="ctr"/>
-            <a:r>
-              <a:rPr lang="en-US" sz="1801" dirty="0" smtClean="0"/>
+            <a:r>
+              <a:rPr lang="en-US" sz="2200" b="1" dirty="0" smtClean="0"/>
               <a:t>PostgreSQL (OMOP schema)</a:t>
             </a:r>
-            <a:endParaRPr lang="en-US" sz="1801" dirty="0"/>
+            <a:endParaRPr lang="en-US" sz="2200" b="1" dirty="0"/>
           </a:p>
         </p:txBody>
       </p:sp>
@@ -4544,15 +4720,14 @@
         <p:nvCxnSpPr>
           <p:cNvPr id="7" name="Straight Arrow Connector 6"/>
           <p:cNvCxnSpPr>
-            <a:stCxn id="4" idx="2"/>
             <a:endCxn id="6" idx="0"/>
           </p:cNvCxnSpPr>
           <p:nvPr/>
         </p:nvCxnSpPr>
         <p:spPr>
           <a:xfrm>
-            <a:off x="4607623" y="3265714"/>
-            <a:ext cx="1" cy="1164768"/>
+            <a:off x="4858303" y="2137678"/>
+            <a:ext cx="1" cy="640482"/>
           </a:xfrm>
           <a:prstGeom prst="straightConnector1">
             <a:avLst/>
@@ -4584,8 +4759,8 @@
         </p:nvCxnSpPr>
         <p:spPr>
           <a:xfrm>
-            <a:off x="1323405" y="3278774"/>
-            <a:ext cx="0" cy="1164768"/>
+            <a:off x="1522170" y="2085974"/>
+            <a:ext cx="1830" cy="695321"/>
           </a:xfrm>
           <a:prstGeom prst="straightConnector1">
             <a:avLst/>
@@ -4609,41 +4784,6 @@
           </a:fontRef>
         </p:style>
       </p:cxnSp>
-      <p:cxnSp>
-        <p:nvCxnSpPr>
-          <p:cNvPr id="9" name="Straight Arrow Connector 8"/>
-          <p:cNvCxnSpPr>
-            <a:stCxn id="6" idx="3"/>
-          </p:cNvCxnSpPr>
-          <p:nvPr/>
-        </p:nvCxnSpPr>
-        <p:spPr>
-          <a:xfrm flipV="1">
-            <a:off x="5770218" y="5190305"/>
-            <a:ext cx="796833" cy="10886"/>
-          </a:xfrm>
-          <a:prstGeom prst="straightConnector1">
-            <a:avLst/>
-          </a:prstGeom>
-          <a:ln>
-            <a:tailEnd type="triangle"/>
-          </a:ln>
-        </p:spPr>
-        <p:style>
-          <a:lnRef idx="1">
-            <a:schemeClr val="accent1"/>
-          </a:lnRef>
-          <a:fillRef idx="0">
-            <a:schemeClr val="accent1"/>
-          </a:fillRef>
-          <a:effectRef idx="0">
-            <a:schemeClr val="accent1"/>
-          </a:effectRef>
-          <a:fontRef idx="minor">
-            <a:schemeClr val="tx1"/>
-          </a:fontRef>
-        </p:style>
-      </p:cxnSp>
       <p:sp>
         <p:nvSpPr>
           <p:cNvPr id="10" name="Rectangle 9"/>
@@ -4652,8 +4792,8 @@
         </p:nvSpPr>
         <p:spPr>
           <a:xfrm>
-            <a:off x="9432170" y="4443542"/>
-            <a:ext cx="2325189" cy="1541417"/>
+            <a:off x="9595457" y="2778160"/>
+            <a:ext cx="2447108" cy="1741444"/>
           </a:xfrm>
           <a:prstGeom prst="rect">
             <a:avLst/>
@@ -4687,49 +4827,49 @@
           </a:bodyPr>
           <a:lstStyle/>
           <a:p>
-            <a:pPr algn="ctr"/>
-            <a:r>
-              <a:rPr lang="en-US" sz="1801" dirty="0" smtClean="0"/>
+            <a:r>
+              <a:rPr lang="en-US" sz="2200" b="1" dirty="0" smtClean="0"/>
               <a:t>RDF </a:t>
             </a:r>
             <a:r>
-              <a:rPr lang="en-US" sz="1801" dirty="0" err="1" smtClean="0"/>
+              <a:rPr lang="en-US" sz="2200" b="1" dirty="0" err="1" smtClean="0"/>
               <a:t>Triplestore</a:t>
             </a:r>
             <a:r>
-              <a:rPr lang="en-US" sz="1801" dirty="0" smtClean="0"/>
+              <a:rPr lang="en-US" sz="2200" b="1" dirty="0" smtClean="0"/>
               <a:t> (</a:t>
             </a:r>
             <a:r>
-              <a:rPr lang="en-US" sz="1801" dirty="0" err="1" smtClean="0"/>
+              <a:rPr lang="en-US" sz="2200" b="1" dirty="0" err="1" smtClean="0"/>
               <a:t>Ontotext</a:t>
             </a:r>
-            <a:r>
-              <a:rPr lang="en-US" sz="1801" dirty="0" smtClean="0"/>
-              <a:t> </a:t>
-            </a:r>
-            <a:r>
-              <a:rPr lang="en-US" sz="1801" dirty="0" err="1" smtClean="0"/>
+            <a:endParaRPr lang="en-US" sz="2200" b="1" dirty="0" smtClean="0"/>
+          </a:p>
+          <a:p>
+            <a:r>
+              <a:rPr lang="en-US" sz="2200" b="1" dirty="0" err="1" smtClean="0"/>
               <a:t>GraphDB</a:t>
             </a:r>
             <a:r>
-              <a:rPr lang="en-US" sz="1801" dirty="0" smtClean="0"/>
+              <a:rPr lang="en-US" sz="2200" b="1" dirty="0" smtClean="0"/>
               <a:t>)</a:t>
             </a:r>
-            <a:endParaRPr lang="en-US" sz="1801" dirty="0"/>
+            <a:endParaRPr lang="en-US" sz="2200" b="1" dirty="0"/>
           </a:p>
         </p:txBody>
       </p:sp>
       <p:cxnSp>
         <p:nvCxnSpPr>
           <p:cNvPr id="13" name="Straight Arrow Connector 12"/>
-          <p:cNvCxnSpPr/>
+          <p:cNvCxnSpPr>
+            <a:stCxn id="23" idx="3"/>
+          </p:cNvCxnSpPr>
           <p:nvPr/>
         </p:nvCxnSpPr>
         <p:spPr>
           <a:xfrm>
-            <a:off x="8824747" y="2316478"/>
-            <a:ext cx="607422" cy="0"/>
+            <a:off x="8993944" y="1188444"/>
+            <a:ext cx="479593" cy="0"/>
           </a:xfrm>
           <a:prstGeom prst="straightConnector1">
             <a:avLst/>
@@ -4753,41 +4893,6 @@
           </a:fontRef>
         </p:style>
       </p:cxnSp>
-      <p:cxnSp>
-        <p:nvCxnSpPr>
-          <p:cNvPr id="14" name="Straight Arrow Connector 13"/>
-          <p:cNvCxnSpPr>
-            <a:endCxn id="10" idx="0"/>
-          </p:cNvCxnSpPr>
-          <p:nvPr/>
-        </p:nvCxnSpPr>
-        <p:spPr>
-          <a:xfrm>
-            <a:off x="10594764" y="3087186"/>
-            <a:ext cx="1" cy="1356356"/>
-          </a:xfrm>
-          <a:prstGeom prst="straightConnector1">
-            <a:avLst/>
-          </a:prstGeom>
-          <a:ln>
-            <a:tailEnd type="triangle"/>
-          </a:ln>
-        </p:spPr>
-        <p:style>
-          <a:lnRef idx="1">
-            <a:schemeClr val="accent1"/>
-          </a:lnRef>
-          <a:fillRef idx="0">
-            <a:schemeClr val="accent1"/>
-          </a:fillRef>
-          <a:effectRef idx="0">
-            <a:schemeClr val="accent1"/>
-          </a:effectRef>
-          <a:fontRef idx="minor">
-            <a:schemeClr val="tx1"/>
-          </a:fontRef>
-        </p:style>
-      </p:cxnSp>
       <p:sp>
         <p:nvSpPr>
           <p:cNvPr id="34" name="Rectangle 33"/>
@@ -4796,8 +4901,8 @@
         </p:nvSpPr>
         <p:spPr>
           <a:xfrm>
-            <a:off x="6567051" y="4443542"/>
-            <a:ext cx="2325189" cy="1541417"/>
+            <a:off x="6659094" y="2796662"/>
+            <a:ext cx="2495627" cy="1752331"/>
           </a:xfrm>
           <a:prstGeom prst="rect">
             <a:avLst/>
@@ -4831,122 +4936,15 @@
           </a:bodyPr>
           <a:lstStyle/>
           <a:p>
-            <a:pPr algn="ctr"/>
-            <a:r>
-              <a:rPr lang="en-US" sz="1801" dirty="0" err="1" smtClean="0"/>
+            <a:r>
+              <a:rPr lang="en-US" sz="2200" b="1" dirty="0" err="1" smtClean="0"/>
               <a:t>Stardog</a:t>
             </a:r>
             <a:r>
-              <a:rPr lang="en-US" sz="1801" dirty="0" smtClean="0"/>
+              <a:rPr lang="en-US" sz="2200" b="1" dirty="0" smtClean="0"/>
               <a:t> Virtual Graph</a:t>
             </a:r>
-            <a:endParaRPr lang="en-US" sz="1801" dirty="0"/>
-          </a:p>
-        </p:txBody>
-      </p:sp>
-      <p:cxnSp>
-        <p:nvCxnSpPr>
-          <p:cNvPr id="35" name="Straight Arrow Connector 34"/>
-          <p:cNvCxnSpPr/>
-          <p:nvPr/>
-        </p:nvCxnSpPr>
-        <p:spPr>
-          <a:xfrm flipV="1">
-            <a:off x="5770218" y="5190304"/>
-            <a:ext cx="796833" cy="10886"/>
-          </a:xfrm>
-          <a:prstGeom prst="straightConnector1">
-            <a:avLst/>
-          </a:prstGeom>
-          <a:ln>
-            <a:tailEnd type="triangle"/>
-          </a:ln>
-        </p:spPr>
-        <p:style>
-          <a:lnRef idx="1">
-            <a:schemeClr val="accent1"/>
-          </a:lnRef>
-          <a:fillRef idx="0">
-            <a:schemeClr val="accent1"/>
-          </a:fillRef>
-          <a:effectRef idx="0">
-            <a:schemeClr val="accent1"/>
-          </a:effectRef>
-          <a:fontRef idx="minor">
-            <a:schemeClr val="tx1"/>
-          </a:fontRef>
-        </p:style>
-      </p:cxnSp>
-      <p:cxnSp>
-        <p:nvCxnSpPr>
-          <p:cNvPr id="36" name="Straight Arrow Connector 35"/>
-          <p:cNvCxnSpPr>
-            <a:stCxn id="34" idx="3"/>
-          </p:cNvCxnSpPr>
-          <p:nvPr/>
-        </p:nvCxnSpPr>
-        <p:spPr>
-          <a:xfrm flipV="1">
-            <a:off x="8892240" y="5214249"/>
-            <a:ext cx="581297" cy="2"/>
-          </a:xfrm>
-          <a:prstGeom prst="straightConnector1">
-            <a:avLst/>
-          </a:prstGeom>
-          <a:ln>
-            <a:tailEnd type="triangle"/>
-          </a:ln>
-        </p:spPr>
-        <p:style>
-          <a:lnRef idx="1">
-            <a:schemeClr val="accent1"/>
-          </a:lnRef>
-          <a:fillRef idx="0">
-            <a:schemeClr val="accent1"/>
-          </a:fillRef>
-          <a:effectRef idx="0">
-            <a:schemeClr val="accent1"/>
-          </a:effectRef>
-          <a:fontRef idx="minor">
-            <a:schemeClr val="tx1"/>
-          </a:fontRef>
-        </p:style>
-      </p:cxnSp>
-      <p:sp>
-        <p:nvSpPr>
-          <p:cNvPr id="40" name="TextBox 39"/>
-          <p:cNvSpPr txBox="1"/>
-          <p:nvPr/>
-        </p:nvSpPr>
-        <p:spPr>
-          <a:xfrm>
-            <a:off x="396246" y="374468"/>
-            <a:ext cx="3503460" cy="369332"/>
-          </a:xfrm>
-          <a:prstGeom prst="rect">
-            <a:avLst/>
-          </a:prstGeom>
-          <a:noFill/>
-        </p:spPr>
-        <p:txBody>
-          <a:bodyPr wrap="none" rtlCol="0">
-            <a:spAutoFit/>
-          </a:bodyPr>
-          <a:lstStyle/>
-          <a:p>
-            <a:r>
-              <a:rPr lang="en-US" dirty="0" smtClean="0"/>
-              <a:t>Fig 3. </a:t>
-            </a:r>
-            <a:r>
-              <a:rPr lang="en-US" dirty="0" err="1" smtClean="0"/>
-              <a:t>Synthea</a:t>
-            </a:r>
-            <a:r>
-              <a:rPr lang="en-US" dirty="0" smtClean="0"/>
-              <a:t> Pipeline Architecture</a:t>
-            </a:r>
-            <a:endParaRPr lang="en-US" dirty="0"/>
+            <a:endParaRPr lang="en-US" sz="2200" b="1" dirty="0"/>
           </a:p>
         </p:txBody>
       </p:sp>
@@ -4958,8 +4956,8 @@
         </p:nvSpPr>
         <p:spPr>
           <a:xfrm>
-            <a:off x="210789" y="4456602"/>
-            <a:ext cx="2325189" cy="1541417"/>
+            <a:off x="306938" y="2790819"/>
+            <a:ext cx="2683900" cy="1789335"/>
           </a:xfrm>
           <a:prstGeom prst="rect">
             <a:avLst/>
@@ -4993,35 +4991,32 @@
           </a:bodyPr>
           <a:lstStyle/>
           <a:p>
-            <a:pPr algn="ctr"/>
-            <a:r>
-              <a:rPr lang="en-US" sz="1801" dirty="0" smtClean="0"/>
+            <a:r>
+              <a:rPr lang="en-US" sz="2200" b="1" dirty="0" smtClean="0"/>
               <a:t>PostgreSQL (</a:t>
             </a:r>
             <a:r>
-              <a:rPr lang="en-US" sz="1801" dirty="0" err="1" smtClean="0"/>
+              <a:rPr lang="en-US" sz="2200" b="1" dirty="0" err="1" smtClean="0"/>
               <a:t>Synthea</a:t>
             </a:r>
             <a:r>
-              <a:rPr lang="en-US" sz="1801" dirty="0" smtClean="0"/>
+              <a:rPr lang="en-US" sz="2200" b="1" dirty="0" smtClean="0"/>
               <a:t> schema)</a:t>
             </a:r>
-            <a:endParaRPr lang="en-US" sz="1801" dirty="0"/>
+            <a:endParaRPr lang="en-US" sz="2200" b="1" dirty="0"/>
           </a:p>
         </p:txBody>
       </p:sp>
       <p:cxnSp>
         <p:nvCxnSpPr>
           <p:cNvPr id="19" name="Straight Arrow Connector 18"/>
-          <p:cNvCxnSpPr>
-            <a:endCxn id="6" idx="1"/>
-          </p:cNvCxnSpPr>
+          <p:cNvCxnSpPr/>
           <p:nvPr/>
         </p:nvCxnSpPr>
         <p:spPr>
-          <a:xfrm>
-            <a:off x="2536648" y="5190305"/>
-            <a:ext cx="908381" cy="10886"/>
+          <a:xfrm flipV="1">
+            <a:off x="2990772" y="3828228"/>
+            <a:ext cx="569644" cy="8013"/>
           </a:xfrm>
           <a:prstGeom prst="straightConnector1">
             <a:avLst/>
@@ -5053,7 +5048,7 @@
         </p:nvSpPr>
         <p:spPr>
           <a:xfrm>
-            <a:off x="6268782" y="1367243"/>
+            <a:off x="6424916" y="239210"/>
             <a:ext cx="2569028" cy="1898468"/>
           </a:xfrm>
           <a:prstGeom prst="roundRect">
@@ -5092,10 +5087,10 @@
           <a:p>
             <a:pPr algn="ctr"/>
             <a:r>
-              <a:rPr lang="en-US" sz="1801" dirty="0" smtClean="0"/>
-              <a:t>Semantic Transformer</a:t>
-            </a:r>
-            <a:endParaRPr lang="en-US" sz="1801" dirty="0"/>
+              <a:rPr lang="en-US" sz="2200" b="1" dirty="0" smtClean="0"/>
+              <a:t>Semantic Engine Language</a:t>
+            </a:r>
+            <a:endParaRPr lang="en-US" sz="2200" b="1" dirty="0"/>
           </a:p>
         </p:txBody>
       </p:sp>
@@ -5107,7 +5102,7 @@
         </p:nvSpPr>
         <p:spPr>
           <a:xfrm>
-            <a:off x="9419106" y="1367243"/>
+            <a:off x="9473537" y="187506"/>
             <a:ext cx="2569028" cy="1898468"/>
           </a:xfrm>
           <a:prstGeom prst="roundRect">
@@ -5144,10 +5139,10 @@
           <a:p>
             <a:pPr algn="ctr"/>
             <a:r>
-              <a:rPr lang="en-US" sz="1801" dirty="0" smtClean="0"/>
-              <a:t>Transformation Interpreter</a:t>
-            </a:r>
-            <a:endParaRPr lang="en-US" sz="1801" dirty="0"/>
+              <a:rPr lang="en-US" sz="2200" b="1" dirty="0" smtClean="0"/>
+              <a:t>Semantic Engine</a:t>
+            </a:r>
+            <a:endParaRPr lang="en-US" sz="2200" b="1" dirty="0"/>
           </a:p>
         </p:txBody>
       </p:sp>
@@ -5159,8 +5154,8 @@
         </p:nvSpPr>
         <p:spPr>
           <a:xfrm>
-            <a:off x="266014" y="1724294"/>
-            <a:ext cx="2325189" cy="1541417"/>
+            <a:off x="306938" y="300439"/>
+            <a:ext cx="2683900" cy="1776011"/>
           </a:xfrm>
           <a:prstGeom prst="rect">
             <a:avLst/>
@@ -5196,19 +5191,409 @@
           </a:bodyPr>
           <a:lstStyle/>
           <a:p>
+            <a:r>
+              <a:rPr lang="en-US" sz="2000" b="1" dirty="0" err="1" smtClean="0"/>
+              <a:t>Synthea</a:t>
+            </a:r>
+            <a:r>
+              <a:rPr lang="en-US" sz="2000" b="1" dirty="0" smtClean="0"/>
+              <a:t> Dataset (CSV file)</a:t>
+            </a:r>
+            <a:endParaRPr lang="en-US" sz="2000" b="1" dirty="0"/>
+          </a:p>
+        </p:txBody>
+      </p:sp>
+      <p:sp>
+        <p:nvSpPr>
+          <p:cNvPr id="28" name="Oval 27"/>
+          <p:cNvSpPr/>
+          <p:nvPr/>
+        </p:nvSpPr>
+        <p:spPr>
+          <a:xfrm>
+            <a:off x="2240694" y="1343026"/>
+            <a:ext cx="753317" cy="733424"/>
+          </a:xfrm>
+          <a:prstGeom prst="ellipse">
+            <a:avLst/>
+          </a:prstGeom>
+          <a:solidFill>
+            <a:schemeClr val="accent4">
+              <a:lumMod val="60000"/>
+              <a:lumOff val="40000"/>
+            </a:schemeClr>
+          </a:solidFill>
+        </p:spPr>
+        <p:style>
+          <a:lnRef idx="2">
+            <a:schemeClr val="accent1">
+              <a:shade val="50000"/>
+            </a:schemeClr>
+          </a:lnRef>
+          <a:fillRef idx="1">
+            <a:schemeClr val="accent1"/>
+          </a:fillRef>
+          <a:effectRef idx="0">
+            <a:schemeClr val="accent1"/>
+          </a:effectRef>
+          <a:fontRef idx="minor">
+            <a:schemeClr val="lt1"/>
+          </a:fontRef>
+        </p:style>
+        <p:txBody>
+          <a:bodyPr rtlCol="0" anchor="ctr"/>
+          <a:lstStyle/>
+          <a:p>
             <a:pPr algn="ctr"/>
             <a:r>
-              <a:rPr lang="en-US" sz="1801" dirty="0" err="1" smtClean="0"/>
-              <a:t>Synthea</a:t>
-            </a:r>
-            <a:r>
-              <a:rPr lang="en-US" sz="1801" dirty="0" smtClean="0"/>
-              <a:t> Dataset (CSV file)</a:t>
-            </a:r>
-            <a:endParaRPr lang="en-US" sz="1801" dirty="0"/>
-          </a:p>
-        </p:txBody>
-      </p:sp>
+              <a:rPr lang="en-US" dirty="0" smtClean="0">
+                <a:solidFill>
+                  <a:schemeClr val="tx1"/>
+                </a:solidFill>
+              </a:rPr>
+              <a:t>1</a:t>
+            </a:r>
+            <a:endParaRPr lang="en-US" dirty="0">
+              <a:solidFill>
+                <a:schemeClr val="tx1"/>
+              </a:solidFill>
+            </a:endParaRPr>
+          </a:p>
+        </p:txBody>
+      </p:sp>
+      <p:sp>
+        <p:nvSpPr>
+          <p:cNvPr id="37" name="Oval 36"/>
+          <p:cNvSpPr/>
+          <p:nvPr/>
+        </p:nvSpPr>
+        <p:spPr>
+          <a:xfrm>
+            <a:off x="2237455" y="3834073"/>
+            <a:ext cx="753317" cy="733424"/>
+          </a:xfrm>
+          <a:prstGeom prst="ellipse">
+            <a:avLst/>
+          </a:prstGeom>
+          <a:solidFill>
+            <a:schemeClr val="accent4">
+              <a:lumMod val="60000"/>
+              <a:lumOff val="40000"/>
+            </a:schemeClr>
+          </a:solidFill>
+        </p:spPr>
+        <p:style>
+          <a:lnRef idx="2">
+            <a:schemeClr val="accent1">
+              <a:shade val="50000"/>
+            </a:schemeClr>
+          </a:lnRef>
+          <a:fillRef idx="1">
+            <a:schemeClr val="accent1"/>
+          </a:fillRef>
+          <a:effectRef idx="0">
+            <a:schemeClr val="accent1"/>
+          </a:effectRef>
+          <a:fontRef idx="minor">
+            <a:schemeClr val="lt1"/>
+          </a:fontRef>
+        </p:style>
+        <p:txBody>
+          <a:bodyPr rtlCol="0" anchor="ctr"/>
+          <a:lstStyle/>
+          <a:p>
+            <a:pPr algn="ctr"/>
+            <a:r>
+              <a:rPr lang="en-US" dirty="0">
+                <a:solidFill>
+                  <a:schemeClr val="tx1"/>
+                </a:solidFill>
+              </a:rPr>
+              <a:t>2</a:t>
+            </a:r>
+            <a:endParaRPr lang="en-US" dirty="0">
+              <a:solidFill>
+                <a:schemeClr val="tx1"/>
+              </a:solidFill>
+            </a:endParaRPr>
+          </a:p>
+        </p:txBody>
+      </p:sp>
+      <p:sp>
+        <p:nvSpPr>
+          <p:cNvPr id="41" name="Oval 40"/>
+          <p:cNvSpPr/>
+          <p:nvPr/>
+        </p:nvSpPr>
+        <p:spPr>
+          <a:xfrm>
+            <a:off x="5402874" y="3813652"/>
+            <a:ext cx="753317" cy="733424"/>
+          </a:xfrm>
+          <a:prstGeom prst="ellipse">
+            <a:avLst/>
+          </a:prstGeom>
+          <a:solidFill>
+            <a:schemeClr val="accent4">
+              <a:lumMod val="60000"/>
+              <a:lumOff val="40000"/>
+            </a:schemeClr>
+          </a:solidFill>
+        </p:spPr>
+        <p:style>
+          <a:lnRef idx="2">
+            <a:schemeClr val="accent1">
+              <a:shade val="50000"/>
+            </a:schemeClr>
+          </a:lnRef>
+          <a:fillRef idx="1">
+            <a:schemeClr val="accent1"/>
+          </a:fillRef>
+          <a:effectRef idx="0">
+            <a:schemeClr val="accent1"/>
+          </a:effectRef>
+          <a:fontRef idx="minor">
+            <a:schemeClr val="lt1"/>
+          </a:fontRef>
+        </p:style>
+        <p:txBody>
+          <a:bodyPr rtlCol="0" anchor="ctr"/>
+          <a:lstStyle/>
+          <a:p>
+            <a:pPr algn="ctr"/>
+            <a:r>
+              <a:rPr lang="en-US" dirty="0" smtClean="0">
+                <a:solidFill>
+                  <a:schemeClr val="tx1"/>
+                </a:solidFill>
+              </a:rPr>
+              <a:t>3</a:t>
+            </a:r>
+            <a:endParaRPr lang="en-US" dirty="0">
+              <a:solidFill>
+                <a:schemeClr val="tx1"/>
+              </a:solidFill>
+            </a:endParaRPr>
+          </a:p>
+        </p:txBody>
+      </p:sp>
+      <p:sp>
+        <p:nvSpPr>
+          <p:cNvPr id="42" name="Oval 41"/>
+          <p:cNvSpPr/>
+          <p:nvPr/>
+        </p:nvSpPr>
+        <p:spPr>
+          <a:xfrm>
+            <a:off x="8401404" y="3813652"/>
+            <a:ext cx="753317" cy="733424"/>
+          </a:xfrm>
+          <a:prstGeom prst="ellipse">
+            <a:avLst/>
+          </a:prstGeom>
+          <a:solidFill>
+            <a:schemeClr val="accent4">
+              <a:lumMod val="60000"/>
+              <a:lumOff val="40000"/>
+            </a:schemeClr>
+          </a:solidFill>
+        </p:spPr>
+        <p:style>
+          <a:lnRef idx="2">
+            <a:schemeClr val="accent1">
+              <a:shade val="50000"/>
+            </a:schemeClr>
+          </a:lnRef>
+          <a:fillRef idx="1">
+            <a:schemeClr val="accent1"/>
+          </a:fillRef>
+          <a:effectRef idx="0">
+            <a:schemeClr val="accent1"/>
+          </a:effectRef>
+          <a:fontRef idx="minor">
+            <a:schemeClr val="lt1"/>
+          </a:fontRef>
+        </p:style>
+        <p:txBody>
+          <a:bodyPr rtlCol="0" anchor="ctr"/>
+          <a:lstStyle/>
+          <a:p>
+            <a:pPr algn="ctr"/>
+            <a:r>
+              <a:rPr lang="en-US" dirty="0">
+                <a:solidFill>
+                  <a:schemeClr val="tx1"/>
+                </a:solidFill>
+              </a:rPr>
+              <a:t>4</a:t>
+            </a:r>
+            <a:endParaRPr lang="en-US" dirty="0">
+              <a:solidFill>
+                <a:schemeClr val="tx1"/>
+              </a:solidFill>
+            </a:endParaRPr>
+          </a:p>
+        </p:txBody>
+      </p:sp>
+      <p:sp>
+        <p:nvSpPr>
+          <p:cNvPr id="43" name="Oval 42"/>
+          <p:cNvSpPr/>
+          <p:nvPr/>
+        </p:nvSpPr>
+        <p:spPr>
+          <a:xfrm>
+            <a:off x="11289248" y="3786180"/>
+            <a:ext cx="753317" cy="733424"/>
+          </a:xfrm>
+          <a:prstGeom prst="ellipse">
+            <a:avLst/>
+          </a:prstGeom>
+          <a:solidFill>
+            <a:schemeClr val="accent4">
+              <a:lumMod val="60000"/>
+              <a:lumOff val="40000"/>
+            </a:schemeClr>
+          </a:solidFill>
+        </p:spPr>
+        <p:style>
+          <a:lnRef idx="2">
+            <a:schemeClr val="accent1">
+              <a:shade val="50000"/>
+            </a:schemeClr>
+          </a:lnRef>
+          <a:fillRef idx="1">
+            <a:schemeClr val="accent1"/>
+          </a:fillRef>
+          <a:effectRef idx="0">
+            <a:schemeClr val="accent1"/>
+          </a:effectRef>
+          <a:fontRef idx="minor">
+            <a:schemeClr val="lt1"/>
+          </a:fontRef>
+        </p:style>
+        <p:txBody>
+          <a:bodyPr rtlCol="0" anchor="ctr"/>
+          <a:lstStyle/>
+          <a:p>
+            <a:pPr algn="ctr"/>
+            <a:r>
+              <a:rPr lang="en-US" dirty="0" smtClean="0">
+                <a:solidFill>
+                  <a:schemeClr val="tx1"/>
+                </a:solidFill>
+              </a:rPr>
+              <a:t>5</a:t>
+            </a:r>
+            <a:endParaRPr lang="en-US" dirty="0">
+              <a:solidFill>
+                <a:schemeClr val="tx1"/>
+              </a:solidFill>
+            </a:endParaRPr>
+          </a:p>
+        </p:txBody>
+      </p:sp>
+      <p:cxnSp>
+        <p:nvCxnSpPr>
+          <p:cNvPr id="49" name="Straight Arrow Connector 48"/>
+          <p:cNvCxnSpPr/>
+          <p:nvPr/>
+        </p:nvCxnSpPr>
+        <p:spPr>
+          <a:xfrm>
+            <a:off x="6156191" y="3732426"/>
+            <a:ext cx="502903" cy="7077"/>
+          </a:xfrm>
+          <a:prstGeom prst="straightConnector1">
+            <a:avLst/>
+          </a:prstGeom>
+          <a:ln>
+            <a:tailEnd type="triangle"/>
+          </a:ln>
+        </p:spPr>
+        <p:style>
+          <a:lnRef idx="1">
+            <a:schemeClr val="accent1"/>
+          </a:lnRef>
+          <a:fillRef idx="0">
+            <a:schemeClr val="accent1"/>
+          </a:fillRef>
+          <a:effectRef idx="0">
+            <a:schemeClr val="accent1"/>
+          </a:effectRef>
+          <a:fontRef idx="minor">
+            <a:schemeClr val="tx1"/>
+          </a:fontRef>
+        </p:style>
+      </p:cxnSp>
+      <p:cxnSp>
+        <p:nvCxnSpPr>
+          <p:cNvPr id="59" name="Straight Arrow Connector 58"/>
+          <p:cNvCxnSpPr/>
+          <p:nvPr/>
+        </p:nvCxnSpPr>
+        <p:spPr>
+          <a:xfrm>
+            <a:off x="9114981" y="3685486"/>
+            <a:ext cx="502903" cy="7077"/>
+          </a:xfrm>
+          <a:prstGeom prst="straightConnector1">
+            <a:avLst/>
+          </a:prstGeom>
+          <a:ln>
+            <a:tailEnd type="triangle"/>
+          </a:ln>
+        </p:spPr>
+        <p:style>
+          <a:lnRef idx="1">
+            <a:schemeClr val="accent1"/>
+          </a:lnRef>
+          <a:fillRef idx="0">
+            <a:schemeClr val="accent1"/>
+          </a:fillRef>
+          <a:effectRef idx="0">
+            <a:schemeClr val="accent1"/>
+          </a:effectRef>
+          <a:fontRef idx="minor">
+            <a:schemeClr val="tx1"/>
+          </a:fontRef>
+        </p:style>
+      </p:cxnSp>
+      <p:cxnSp>
+        <p:nvCxnSpPr>
+          <p:cNvPr id="64" name="Straight Arrow Connector 63"/>
+          <p:cNvCxnSpPr>
+            <a:stCxn id="24" idx="2"/>
+          </p:cNvCxnSpPr>
+          <p:nvPr/>
+        </p:nvCxnSpPr>
+        <p:spPr>
+          <a:xfrm>
+            <a:off x="10758051" y="2085974"/>
+            <a:ext cx="0" cy="728654"/>
+          </a:xfrm>
+          <a:prstGeom prst="straightConnector1">
+            <a:avLst/>
+          </a:prstGeom>
+          <a:ln>
+            <a:tailEnd type="triangle"/>
+          </a:ln>
+        </p:spPr>
+        <p:style>
+          <a:lnRef idx="1">
+            <a:schemeClr val="accent1"/>
+          </a:lnRef>
+          <a:fillRef idx="0">
+            <a:schemeClr val="accent1"/>
+          </a:fillRef>
+          <a:effectRef idx="0">
+            <a:schemeClr val="accent1"/>
+          </a:effectRef>
+          <a:fontRef idx="minor">
+            <a:schemeClr val="tx1"/>
+          </a:fontRef>
+        </p:style>
+      </p:cxnSp>
     </p:spTree>
     <p:extLst>
       <p:ext uri="{BB962C8B-B14F-4D97-AF65-F5344CB8AC3E}">
@@ -5246,36 +5631,6 @@
           <a:chExt cx="0" cy="0"/>
         </a:xfrm>
       </p:grpSpPr>
-      <p:sp>
-        <p:nvSpPr>
-          <p:cNvPr id="4" name="TextBox 3"/>
-          <p:cNvSpPr txBox="1"/>
-          <p:nvPr/>
-        </p:nvSpPr>
-        <p:spPr>
-          <a:xfrm>
-            <a:off x="396246" y="374468"/>
-            <a:ext cx="5791457" cy="369332"/>
-          </a:xfrm>
-          <a:prstGeom prst="rect">
-            <a:avLst/>
-          </a:prstGeom>
-          <a:noFill/>
-        </p:spPr>
-        <p:txBody>
-          <a:bodyPr wrap="none" rtlCol="0">
-            <a:spAutoFit/>
-          </a:bodyPr>
-          <a:lstStyle/>
-          <a:p>
-            <a:r>
-              <a:rPr lang="en-US" dirty="0" smtClean="0"/>
-              <a:t>Fig 4. Initial Raw SPARQL Approach for PDS/Carnival Dataset</a:t>
-            </a:r>
-            <a:endParaRPr lang="en-US" dirty="0"/>
-          </a:p>
-        </p:txBody>
-      </p:sp>
       <p:cxnSp>
         <p:nvCxnSpPr>
           <p:cNvPr id="9" name="Straight Arrow Connector 8"/>
@@ -5995,36 +6350,6 @@
       </p:grpSpPr>
       <p:sp>
         <p:nvSpPr>
-          <p:cNvPr id="4" name="TextBox 3"/>
-          <p:cNvSpPr txBox="1"/>
-          <p:nvPr/>
-        </p:nvSpPr>
-        <p:spPr>
-          <a:xfrm>
-            <a:off x="396246" y="374468"/>
-            <a:ext cx="5706114" cy="369332"/>
-          </a:xfrm>
-          <a:prstGeom prst="rect">
-            <a:avLst/>
-          </a:prstGeom>
-          <a:noFill/>
-        </p:spPr>
-        <p:txBody>
-          <a:bodyPr wrap="none" rtlCol="0">
-            <a:spAutoFit/>
-          </a:bodyPr>
-          <a:lstStyle/>
-          <a:p>
-            <a:r>
-              <a:rPr lang="en-US" dirty="0" smtClean="0"/>
-              <a:t>Fig 5. Subsequent Acorn Approach for PDS/Carnival Dataset</a:t>
-            </a:r>
-            <a:endParaRPr lang="en-US" dirty="0"/>
-          </a:p>
-        </p:txBody>
-      </p:sp>
-      <p:sp>
-        <p:nvSpPr>
           <p:cNvPr id="5" name="Rectangle 4"/>
           <p:cNvSpPr/>
           <p:nvPr/>
@@ -6917,48 +7242,14 @@
       </p:grpSpPr>
       <p:sp>
         <p:nvSpPr>
-          <p:cNvPr id="4" name="TextBox 3"/>
-          <p:cNvSpPr txBox="1"/>
-          <p:nvPr/>
-        </p:nvSpPr>
-        <p:spPr>
-          <a:xfrm>
-            <a:off x="396246" y="374468"/>
-            <a:ext cx="3130216" cy="369332"/>
-          </a:xfrm>
-          <a:prstGeom prst="rect">
-            <a:avLst/>
-          </a:prstGeom>
-          <a:noFill/>
-        </p:spPr>
-        <p:txBody>
-          <a:bodyPr wrap="none" rtlCol="0">
-            <a:spAutoFit/>
-          </a:bodyPr>
-          <a:lstStyle/>
-          <a:p>
-            <a:r>
-              <a:rPr lang="en-US" dirty="0" smtClean="0"/>
-              <a:t>Fig 5. </a:t>
-            </a:r>
-            <a:r>
-              <a:rPr lang="en-US" dirty="0" smtClean="0"/>
-              <a:t>Acorn Semantics Diagram</a:t>
-            </a:r>
-            <a:endParaRPr lang="en-US" dirty="0"/>
-          </a:p>
-        </p:txBody>
-      </p:sp>
-      <p:sp>
-        <p:nvSpPr>
           <p:cNvPr id="5" name="Rectangle 4"/>
           <p:cNvSpPr/>
           <p:nvPr/>
         </p:nvSpPr>
         <p:spPr>
           <a:xfrm>
-            <a:off x="536969" y="1159498"/>
-            <a:ext cx="5279369" cy="5293842"/>
+            <a:off x="226243" y="254524"/>
+            <a:ext cx="6516430" cy="6198816"/>
           </a:xfrm>
           <a:prstGeom prst="rect">
             <a:avLst/>
@@ -7003,8 +7294,8 @@
         </p:nvSpPr>
         <p:spPr>
           <a:xfrm>
-            <a:off x="6156273" y="1239099"/>
-            <a:ext cx="5598951" cy="3455498"/>
+            <a:off x="6957665" y="254524"/>
+            <a:ext cx="4797560" cy="6198816"/>
           </a:xfrm>
           <a:prstGeom prst="rect">
             <a:avLst/>
@@ -7049,8 +7340,8 @@
         </p:nvSpPr>
         <p:spPr>
           <a:xfrm>
-            <a:off x="1517645" y="1349757"/>
-            <a:ext cx="4374108" cy="369332"/>
+            <a:off x="891783" y="582612"/>
+            <a:ext cx="5185350" cy="553998"/>
           </a:xfrm>
           <a:prstGeom prst="rect">
             <a:avLst/>
@@ -7064,10 +7355,10 @@
           <a:lstStyle/>
           <a:p>
             <a:r>
-              <a:rPr lang="en-US" dirty="0" smtClean="0"/>
+              <a:rPr lang="en-US" sz="3000" b="1" dirty="0" smtClean="0"/>
               <a:t>Transformation Instruction Set</a:t>
             </a:r>
-            <a:endParaRPr lang="en-US" dirty="0"/>
+            <a:endParaRPr lang="en-US" sz="3000" b="1" dirty="0"/>
           </a:p>
         </p:txBody>
       </p:sp>
@@ -7079,8 +7370,8 @@
         </p:nvSpPr>
         <p:spPr>
           <a:xfrm>
-            <a:off x="6872429" y="1353168"/>
-            <a:ext cx="4374108" cy="369332"/>
+            <a:off x="7169391" y="523995"/>
+            <a:ext cx="4374108" cy="553998"/>
           </a:xfrm>
           <a:prstGeom prst="rect">
             <a:avLst/>
@@ -7095,10 +7386,10 @@
           <a:p>
             <a:pPr algn="ctr"/>
             <a:r>
-              <a:rPr lang="en-US" dirty="0" smtClean="0"/>
+              <a:rPr lang="en-US" sz="3000" b="1" dirty="0" smtClean="0"/>
               <a:t>Graph Specification</a:t>
             </a:r>
-            <a:endParaRPr lang="en-US" dirty="0"/>
+            <a:endParaRPr lang="en-US" sz="3000" b="1" dirty="0"/>
           </a:p>
         </p:txBody>
       </p:sp>
@@ -7110,8 +7401,8 @@
         </p:nvSpPr>
         <p:spPr>
           <a:xfrm>
-            <a:off x="3761904" y="2378679"/>
-            <a:ext cx="1772239" cy="1216057"/>
+            <a:off x="4762682" y="2417816"/>
+            <a:ext cx="1852061" cy="1216057"/>
           </a:xfrm>
           <a:prstGeom prst="rect">
             <a:avLst/>
@@ -7144,10 +7435,10 @@
           <a:p>
             <a:pPr algn="ctr"/>
             <a:r>
-              <a:rPr lang="en-US" dirty="0" smtClean="0"/>
+              <a:rPr lang="en-US" sz="2400" b="1" dirty="0" smtClean="0"/>
               <a:t>Process Specification</a:t>
             </a:r>
-            <a:endParaRPr lang="en-US" dirty="0"/>
+            <a:endParaRPr lang="en-US" sz="2400" b="1" dirty="0"/>
           </a:p>
         </p:txBody>
       </p:sp>
@@ -7159,7 +7450,7 @@
         </p:nvSpPr>
         <p:spPr>
           <a:xfrm>
-            <a:off x="784608" y="2378679"/>
+            <a:off x="327029" y="2417816"/>
             <a:ext cx="1772239" cy="1216057"/>
           </a:xfrm>
           <a:prstGeom prst="rect">
@@ -7193,10 +7484,10 @@
           <a:p>
             <a:pPr algn="ctr"/>
             <a:r>
-              <a:rPr lang="en-US" dirty="0" smtClean="0"/>
+              <a:rPr lang="en-US" sz="2400" b="1" dirty="0" smtClean="0"/>
               <a:t>Connection Recipe</a:t>
             </a:r>
-            <a:endParaRPr lang="en-US" dirty="0"/>
+            <a:endParaRPr lang="en-US" sz="2400" b="1" dirty="0"/>
           </a:p>
         </p:txBody>
       </p:sp>
@@ -7210,8 +7501,8 @@
         </p:nvCxnSpPr>
         <p:spPr>
           <a:xfrm flipH="1" flipV="1">
-            <a:off x="2556847" y="2986707"/>
-            <a:ext cx="1205057" cy="1"/>
+            <a:off x="2099268" y="3014260"/>
+            <a:ext cx="2663414" cy="11585"/>
           </a:xfrm>
           <a:prstGeom prst="straightConnector1">
             <a:avLst/>
@@ -7235,50 +7526,6 @@
           </a:fontRef>
         </p:style>
       </p:cxnSp>
-      <p:sp>
-        <p:nvSpPr>
-          <p:cNvPr id="16" name="TextBox 15"/>
-          <p:cNvSpPr txBox="1"/>
-          <p:nvPr/>
-        </p:nvSpPr>
-        <p:spPr>
-          <a:xfrm>
-            <a:off x="2556847" y="2391229"/>
-            <a:ext cx="1316175" cy="646331"/>
-          </a:xfrm>
-          <a:prstGeom prst="rect">
-            <a:avLst/>
-          </a:prstGeom>
-          <a:noFill/>
-        </p:spPr>
-        <p:txBody>
-          <a:bodyPr wrap="square" rtlCol="0">
-            <a:spAutoFit/>
-          </a:bodyPr>
-          <a:lstStyle/>
-          <a:p>
-            <a:r>
-              <a:rPr lang="en-US" sz="1200" dirty="0" err="1" smtClean="0"/>
-              <a:t>hasRequiredInput</a:t>
-            </a:r>
-            <a:endParaRPr lang="en-US" sz="1200" dirty="0" smtClean="0"/>
-          </a:p>
-          <a:p>
-            <a:r>
-              <a:rPr lang="en-US" sz="1200" dirty="0" err="1" smtClean="0"/>
-              <a:t>hasOptionalInput</a:t>
-            </a:r>
-            <a:endParaRPr lang="en-US" sz="1200" dirty="0" smtClean="0"/>
-          </a:p>
-          <a:p>
-            <a:r>
-              <a:rPr lang="en-US" sz="1200" dirty="0" err="1" smtClean="0"/>
-              <a:t>hasOutput</a:t>
-            </a:r>
-            <a:endParaRPr lang="en-US" sz="1200" dirty="0"/>
-          </a:p>
-        </p:txBody>
-      </p:sp>
       <p:cxnSp>
         <p:nvCxnSpPr>
           <p:cNvPr id="17" name="Straight Arrow Connector 16"/>
@@ -7287,8 +7534,8 @@
         </p:nvCxnSpPr>
         <p:spPr>
           <a:xfrm flipV="1">
-            <a:off x="5534143" y="2986707"/>
-            <a:ext cx="2431506" cy="12550"/>
+            <a:off x="6614743" y="2971488"/>
+            <a:ext cx="3024316" cy="2785"/>
           </a:xfrm>
           <a:prstGeom prst="straightConnector1">
             <a:avLst/>
@@ -7314,13 +7561,74 @@
       </p:cxnSp>
       <p:sp>
         <p:nvSpPr>
-          <p:cNvPr id="19" name="Rectangle 18"/>
+          <p:cNvPr id="21" name="TextBox 20"/>
+          <p:cNvSpPr txBox="1"/>
+          <p:nvPr/>
+        </p:nvSpPr>
+        <p:spPr>
+          <a:xfrm>
+            <a:off x="6923419" y="1744128"/>
+            <a:ext cx="3598208" cy="1246495"/>
+          </a:xfrm>
+          <a:prstGeom prst="rect">
+            <a:avLst/>
+          </a:prstGeom>
+          <a:noFill/>
+        </p:spPr>
+        <p:txBody>
+          <a:bodyPr wrap="square" rtlCol="0">
+            <a:spAutoFit/>
+          </a:bodyPr>
+          <a:lstStyle/>
+          <a:p>
+            <a:r>
+              <a:rPr lang="en-US" sz="1500" b="1" dirty="0" err="1" smtClean="0"/>
+              <a:t>semExpander:hasRequiredInput</a:t>
+            </a:r>
+            <a:r>
+              <a:rPr lang="en-US" sz="1500" b="1" dirty="0" smtClean="0"/>
+              <a:t> </a:t>
+            </a:r>
+          </a:p>
+          <a:p>
+            <a:r>
+              <a:rPr lang="en-US" sz="1500" b="1" dirty="0" smtClean="0"/>
+              <a:t>OR</a:t>
+            </a:r>
+            <a:endParaRPr lang="en-US" sz="1500" b="1" dirty="0" smtClean="0"/>
+          </a:p>
+          <a:p>
+            <a:r>
+              <a:rPr lang="en-US" sz="1500" b="1" dirty="0" err="1" smtClean="0"/>
+              <a:t>semExpander:hasOptionalInput</a:t>
+            </a:r>
+            <a:endParaRPr lang="en-US" sz="1500" b="1" dirty="0" smtClean="0"/>
+          </a:p>
+          <a:p>
+            <a:r>
+              <a:rPr lang="en-US" sz="1500" b="1" dirty="0" smtClean="0"/>
+              <a:t>OR</a:t>
+            </a:r>
+            <a:endParaRPr lang="en-US" sz="1500" b="1" dirty="0" smtClean="0"/>
+          </a:p>
+          <a:p>
+            <a:r>
+              <a:rPr lang="en-US" sz="1500" b="1" dirty="0" err="1" smtClean="0"/>
+              <a:t>semExpander:hasOutput</a:t>
+            </a:r>
+            <a:endParaRPr lang="en-US" sz="1500" b="1" dirty="0"/>
+          </a:p>
+        </p:txBody>
+      </p:sp>
+      <p:sp>
+        <p:nvSpPr>
+          <p:cNvPr id="22" name="Rectangle 21"/>
           <p:cNvSpPr/>
           <p:nvPr/>
         </p:nvSpPr>
         <p:spPr>
           <a:xfrm>
-            <a:off x="7965649" y="2391229"/>
+            <a:off x="1026979" y="4801184"/>
             <a:ext cx="1772239" cy="1216057"/>
           </a:xfrm>
           <a:prstGeom prst="rect">
@@ -7354,23 +7662,58 @@
           <a:p>
             <a:pPr algn="ctr"/>
             <a:r>
-              <a:rPr lang="en-US" dirty="0" smtClean="0"/>
-              <a:t>Connection Recipe</a:t>
-            </a:r>
-            <a:endParaRPr lang="en-US" dirty="0"/>
-          </a:p>
-        </p:txBody>
-      </p:sp>
-      <p:sp>
-        <p:nvSpPr>
-          <p:cNvPr id="21" name="TextBox 20"/>
+              <a:rPr lang="en-US" sz="2400" b="1" dirty="0" smtClean="0"/>
+              <a:t>Named Graph</a:t>
+            </a:r>
+            <a:endParaRPr lang="en-US" sz="2400" b="1" dirty="0"/>
+          </a:p>
+        </p:txBody>
+      </p:sp>
+      <p:cxnSp>
+        <p:nvCxnSpPr>
+          <p:cNvPr id="23" name="Straight Arrow Connector 22"/>
+          <p:cNvCxnSpPr>
+            <a:endCxn id="22" idx="0"/>
+          </p:cNvCxnSpPr>
+          <p:nvPr/>
+        </p:nvCxnSpPr>
+        <p:spPr>
+          <a:xfrm flipH="1">
+            <a:off x="1913099" y="3477416"/>
+            <a:ext cx="2845300" cy="1323768"/>
+          </a:xfrm>
+          <a:prstGeom prst="straightConnector1">
+            <a:avLst/>
+          </a:prstGeom>
+          <a:ln>
+            <a:tailEnd type="triangle"/>
+          </a:ln>
+        </p:spPr>
+        <p:style>
+          <a:lnRef idx="1">
+            <a:schemeClr val="accent1"/>
+          </a:lnRef>
+          <a:fillRef idx="0">
+            <a:schemeClr val="accent1"/>
+          </a:fillRef>
+          <a:effectRef idx="0">
+            <a:schemeClr val="accent1"/>
+          </a:effectRef>
+          <a:fontRef idx="minor">
+            <a:schemeClr val="tx1"/>
+          </a:fontRef>
+        </p:style>
+      </p:cxnSp>
+      <p:sp>
+        <p:nvSpPr>
+          <p:cNvPr id="26" name="TextBox 25"/>
           <p:cNvSpPr txBox="1"/>
           <p:nvPr/>
         </p:nvSpPr>
         <p:spPr>
           <a:xfrm>
-            <a:off x="6290109" y="2378679"/>
-            <a:ext cx="1316175" cy="646331"/>
+            <a:off x="1851888" y="3978154"/>
+            <a:ext cx="4513256" cy="323165"/>
           </a:xfrm>
           <a:prstGeom prst="rect">
             <a:avLst/>
@@ -7384,36 +7727,83 @@
           <a:lstStyle/>
           <a:p>
             <a:r>
-              <a:rPr lang="en-US" sz="1200" dirty="0" err="1" smtClean="0"/>
-              <a:t>hasRequiredInput</a:t>
-            </a:r>
-            <a:endParaRPr lang="en-US" sz="1200" dirty="0" smtClean="0"/>
-          </a:p>
-          <a:p>
-            <a:r>
-              <a:rPr lang="en-US" sz="1200" dirty="0" err="1" smtClean="0"/>
-              <a:t>hasOptionalInput</a:t>
-            </a:r>
-            <a:endParaRPr lang="en-US" sz="1200" dirty="0" smtClean="0"/>
-          </a:p>
-          <a:p>
-            <a:r>
-              <a:rPr lang="en-US" sz="1200" dirty="0" err="1" smtClean="0"/>
-              <a:t>hasOutput</a:t>
-            </a:r>
-            <a:endParaRPr lang="en-US" sz="1200" dirty="0"/>
-          </a:p>
-        </p:txBody>
-      </p:sp>
-      <p:sp>
-        <p:nvSpPr>
-          <p:cNvPr id="22" name="Rectangle 21"/>
+              <a:rPr lang="en-US" sz="1500" b="1" dirty="0" err="1" smtClean="0"/>
+              <a:t>semExpander:inputNamedGraph</a:t>
+            </a:r>
+            <a:endParaRPr lang="en-US" sz="1500" b="1" dirty="0" smtClean="0"/>
+          </a:p>
+        </p:txBody>
+      </p:sp>
+      <p:sp>
+        <p:nvSpPr>
+          <p:cNvPr id="18" name="TextBox 17"/>
+          <p:cNvSpPr txBox="1"/>
+          <p:nvPr/>
+        </p:nvSpPr>
+        <p:spPr>
+          <a:xfrm>
+            <a:off x="2103551" y="1779349"/>
+            <a:ext cx="3598208" cy="1246495"/>
+          </a:xfrm>
+          <a:prstGeom prst="rect">
+            <a:avLst/>
+          </a:prstGeom>
+          <a:noFill/>
+        </p:spPr>
+        <p:txBody>
+          <a:bodyPr wrap="square" rtlCol="0">
+            <a:spAutoFit/>
+          </a:bodyPr>
+          <a:lstStyle/>
+          <a:p>
+            <a:r>
+              <a:rPr lang="en-US" sz="1500" b="1" dirty="0" err="1" smtClean="0"/>
+              <a:t>semExpander:hasRequiredInput</a:t>
+            </a:r>
+            <a:r>
+              <a:rPr lang="en-US" sz="1500" b="1" dirty="0" smtClean="0"/>
+              <a:t> </a:t>
+            </a:r>
+          </a:p>
+          <a:p>
+            <a:r>
+              <a:rPr lang="en-US" sz="1500" b="1" dirty="0" smtClean="0"/>
+              <a:t>OR</a:t>
+            </a:r>
+            <a:endParaRPr lang="en-US" sz="1500" b="1" dirty="0" smtClean="0"/>
+          </a:p>
+          <a:p>
+            <a:r>
+              <a:rPr lang="en-US" sz="1500" b="1" dirty="0" err="1" smtClean="0"/>
+              <a:t>semExpander:hasOptionalInput</a:t>
+            </a:r>
+            <a:endParaRPr lang="en-US" sz="1500" b="1" dirty="0" smtClean="0"/>
+          </a:p>
+          <a:p>
+            <a:r>
+              <a:rPr lang="en-US" sz="1500" b="1" dirty="0" smtClean="0"/>
+              <a:t>OR</a:t>
+            </a:r>
+            <a:endParaRPr lang="en-US" sz="1500" b="1" dirty="0" smtClean="0"/>
+          </a:p>
+          <a:p>
+            <a:r>
+              <a:rPr lang="en-US" sz="1500" b="1" dirty="0" err="1" smtClean="0"/>
+              <a:t>semExpander:hasOutput</a:t>
+            </a:r>
+            <a:endParaRPr lang="en-US" sz="1500" b="1" dirty="0"/>
+          </a:p>
+        </p:txBody>
+      </p:sp>
+      <p:sp>
+        <p:nvSpPr>
+          <p:cNvPr id="24" name="Rectangle 23"/>
           <p:cNvSpPr/>
           <p:nvPr/>
         </p:nvSpPr>
         <p:spPr>
           <a:xfrm>
-            <a:off x="784608" y="4694597"/>
+            <a:off x="9639059" y="2381464"/>
             <a:ext cx="1772239" cy="1216057"/>
           </a:xfrm>
           <a:prstGeom prst="rect">
@@ -7447,23 +7837,72 @@
           <a:p>
             <a:pPr algn="ctr"/>
             <a:r>
-              <a:rPr lang="en-US" dirty="0" smtClean="0"/>
+              <a:rPr lang="en-US" sz="2400" b="1" dirty="0" smtClean="0"/>
+              <a:t>Connection Recipe</a:t>
+            </a:r>
+            <a:endParaRPr lang="en-US" sz="2400" b="1" dirty="0"/>
+          </a:p>
+        </p:txBody>
+      </p:sp>
+      <p:sp>
+        <p:nvSpPr>
+          <p:cNvPr id="25" name="Rectangle 24"/>
+          <p:cNvSpPr/>
+          <p:nvPr/>
+        </p:nvSpPr>
+        <p:spPr>
+          <a:xfrm>
+            <a:off x="4728482" y="4834661"/>
+            <a:ext cx="1772239" cy="1216057"/>
+          </a:xfrm>
+          <a:prstGeom prst="rect">
+            <a:avLst/>
+          </a:prstGeom>
+          <a:solidFill>
+            <a:schemeClr val="tx2">
+              <a:lumMod val="50000"/>
+            </a:schemeClr>
+          </a:solidFill>
+        </p:spPr>
+        <p:style>
+          <a:lnRef idx="2">
+            <a:schemeClr val="accent1">
+              <a:shade val="50000"/>
+            </a:schemeClr>
+          </a:lnRef>
+          <a:fillRef idx="1">
+            <a:schemeClr val="accent1"/>
+          </a:fillRef>
+          <a:effectRef idx="0">
+            <a:schemeClr val="accent1"/>
+          </a:effectRef>
+          <a:fontRef idx="minor">
+            <a:schemeClr val="lt1"/>
+          </a:fontRef>
+        </p:style>
+        <p:txBody>
+          <a:bodyPr rtlCol="0" anchor="ctr"/>
+          <a:lstStyle/>
+          <a:p>
+            <a:pPr algn="ctr"/>
+            <a:r>
+              <a:rPr lang="en-US" sz="2400" b="1" dirty="0" smtClean="0"/>
               <a:t>Named Graph</a:t>
             </a:r>
-            <a:endParaRPr lang="en-US" dirty="0"/>
+            <a:endParaRPr lang="en-US" sz="2400" b="1" dirty="0"/>
           </a:p>
         </p:txBody>
       </p:sp>
       <p:cxnSp>
         <p:nvCxnSpPr>
-          <p:cNvPr id="23" name="Straight Arrow Connector 22"/>
+          <p:cNvPr id="27" name="Straight Arrow Connector 26"/>
           <p:cNvCxnSpPr/>
           <p:nvPr/>
         </p:nvCxnSpPr>
         <p:spPr>
-          <a:xfrm flipH="1">
-            <a:off x="2556847" y="3582186"/>
-            <a:ext cx="1205057" cy="1112411"/>
+          <a:xfrm>
+            <a:off x="5651282" y="3633873"/>
+            <a:ext cx="9334" cy="1211689"/>
           </a:xfrm>
           <a:prstGeom prst="straightConnector1">
             <a:avLst/>
@@ -7489,14 +7928,14 @@
       </p:cxnSp>
       <p:sp>
         <p:nvSpPr>
-          <p:cNvPr id="26" name="TextBox 25"/>
+          <p:cNvPr id="28" name="TextBox 27"/>
           <p:cNvSpPr txBox="1"/>
           <p:nvPr/>
         </p:nvSpPr>
         <p:spPr>
           <a:xfrm>
-            <a:off x="2556847" y="3809256"/>
-            <a:ext cx="1579549" cy="461665"/>
+            <a:off x="4244093" y="4263656"/>
+            <a:ext cx="4513256" cy="323165"/>
           </a:xfrm>
           <a:prstGeom prst="rect">
             <a:avLst/>
@@ -7510,17 +7949,10 @@
           <a:lstStyle/>
           <a:p>
             <a:r>
-              <a:rPr lang="en-US" sz="1200" dirty="0" err="1" smtClean="0"/>
-              <a:t>inputNamedGraph</a:t>
-            </a:r>
-            <a:endParaRPr lang="en-US" sz="1200" dirty="0" smtClean="0"/>
-          </a:p>
-          <a:p>
-            <a:r>
-              <a:rPr lang="en-US" sz="1200" dirty="0" err="1" smtClean="0"/>
-              <a:t>outputNamedGraph</a:t>
-            </a:r>
-            <a:endParaRPr lang="en-US" sz="1200" dirty="0" smtClean="0"/>
+              <a:rPr lang="en-US" sz="1500" b="1" dirty="0" err="1" smtClean="0"/>
+              <a:t>semExpander:outputNamedGraph</a:t>
+            </a:r>
+            <a:endParaRPr lang="en-US" sz="1500" b="1" dirty="0" smtClean="0"/>
           </a:p>
         </p:txBody>
       </p:sp>
@@ -7528,6 +7960,368 @@
     <p:extLst>
       <p:ext uri="{BB962C8B-B14F-4D97-AF65-F5344CB8AC3E}">
         <p14:creationId xmlns:p14="http://schemas.microsoft.com/office/powerpoint/2010/main" val="3767419629"/>
+      </p:ext>
+    </p:extLst>
+  </p:cSld>
+  <p:clrMapOvr>
+    <a:masterClrMapping/>
+  </p:clrMapOvr>
+</p:sld>
+</file>
+
+<file path=ppt/slides/slide7.xml><?xml version="1.0" encoding="utf-8"?>
+<p:sld xmlns:a="http://schemas.openxmlformats.org/drawingml/2006/main" xmlns:r="http://schemas.openxmlformats.org/officeDocument/2006/relationships" xmlns:p="http://schemas.openxmlformats.org/presentationml/2006/main">
+  <p:cSld>
+    <p:spTree>
+      <p:nvGrpSpPr>
+        <p:cNvPr id="1" name=""/>
+        <p:cNvGrpSpPr/>
+        <p:nvPr/>
+      </p:nvGrpSpPr>
+      <p:grpSpPr>
+        <a:xfrm>
+          <a:off x="0" y="0"/>
+          <a:ext cx="0" cy="0"/>
+          <a:chOff x="0" y="0"/>
+          <a:chExt cx="0" cy="0"/>
+        </a:xfrm>
+      </p:grpSpPr>
+      <p:sp>
+        <p:nvSpPr>
+          <p:cNvPr id="4" name="Oval 3"/>
+          <p:cNvSpPr/>
+          <p:nvPr/>
+        </p:nvSpPr>
+        <p:spPr>
+          <a:xfrm>
+            <a:off x="448552" y="4081807"/>
+            <a:ext cx="2601798" cy="2413262"/>
+          </a:xfrm>
+          <a:prstGeom prst="ellipse">
+            <a:avLst/>
+          </a:prstGeom>
+        </p:spPr>
+        <p:style>
+          <a:lnRef idx="2">
+            <a:schemeClr val="accent1">
+              <a:shade val="50000"/>
+            </a:schemeClr>
+          </a:lnRef>
+          <a:fillRef idx="1">
+            <a:schemeClr val="accent1"/>
+          </a:fillRef>
+          <a:effectRef idx="0">
+            <a:schemeClr val="accent1"/>
+          </a:effectRef>
+          <a:fontRef idx="minor">
+            <a:schemeClr val="lt1"/>
+          </a:fontRef>
+        </p:style>
+        <p:txBody>
+          <a:bodyPr rtlCol="0" anchor="ctr"/>
+          <a:lstStyle/>
+          <a:p>
+            <a:pPr algn="ctr"/>
+            <a:r>
+              <a:rPr lang="en-US" sz="3000" b="1" dirty="0" smtClean="0"/>
+              <a:t>Class B</a:t>
+            </a:r>
+            <a:endParaRPr lang="en-US" sz="3000" b="1" dirty="0"/>
+          </a:p>
+        </p:txBody>
+      </p:sp>
+      <p:sp>
+        <p:nvSpPr>
+          <p:cNvPr id="5" name="Oval 4"/>
+          <p:cNvSpPr/>
+          <p:nvPr/>
+        </p:nvSpPr>
+        <p:spPr>
+          <a:xfrm>
+            <a:off x="9287054" y="4013420"/>
+            <a:ext cx="2601798" cy="2413262"/>
+          </a:xfrm>
+          <a:prstGeom prst="ellipse">
+            <a:avLst/>
+          </a:prstGeom>
+        </p:spPr>
+        <p:style>
+          <a:lnRef idx="2">
+            <a:schemeClr val="accent1">
+              <a:shade val="50000"/>
+            </a:schemeClr>
+          </a:lnRef>
+          <a:fillRef idx="1">
+            <a:schemeClr val="accent1"/>
+          </a:fillRef>
+          <a:effectRef idx="0">
+            <a:schemeClr val="accent1"/>
+          </a:effectRef>
+          <a:fontRef idx="minor">
+            <a:schemeClr val="lt1"/>
+          </a:fontRef>
+        </p:style>
+        <p:txBody>
+          <a:bodyPr rtlCol="0" anchor="ctr"/>
+          <a:lstStyle/>
+          <a:p>
+            <a:pPr algn="ctr"/>
+            <a:r>
+              <a:rPr lang="en-US" sz="3000" b="1" dirty="0" smtClean="0"/>
+              <a:t>Class C</a:t>
+            </a:r>
+            <a:endParaRPr lang="en-US" sz="3000" b="1" dirty="0"/>
+          </a:p>
+        </p:txBody>
+      </p:sp>
+      <p:sp>
+        <p:nvSpPr>
+          <p:cNvPr id="6" name="Oval 5"/>
+          <p:cNvSpPr/>
+          <p:nvPr/>
+        </p:nvSpPr>
+        <p:spPr>
+          <a:xfrm>
+            <a:off x="4418805" y="197963"/>
+            <a:ext cx="2601798" cy="2413262"/>
+          </a:xfrm>
+          <a:prstGeom prst="ellipse">
+            <a:avLst/>
+          </a:prstGeom>
+        </p:spPr>
+        <p:style>
+          <a:lnRef idx="2">
+            <a:schemeClr val="accent1">
+              <a:shade val="50000"/>
+            </a:schemeClr>
+          </a:lnRef>
+          <a:fillRef idx="1">
+            <a:schemeClr val="accent1"/>
+          </a:fillRef>
+          <a:effectRef idx="0">
+            <a:schemeClr val="accent1"/>
+          </a:effectRef>
+          <a:fontRef idx="minor">
+            <a:schemeClr val="lt1"/>
+          </a:fontRef>
+        </p:style>
+        <p:txBody>
+          <a:bodyPr rtlCol="0" anchor="ctr"/>
+          <a:lstStyle/>
+          <a:p>
+            <a:pPr algn="ctr"/>
+            <a:r>
+              <a:rPr lang="en-US" sz="3000" b="1" dirty="0" smtClean="0"/>
+              <a:t>Class A</a:t>
+            </a:r>
+            <a:endParaRPr lang="en-US" sz="3000" b="1" dirty="0"/>
+          </a:p>
+        </p:txBody>
+      </p:sp>
+      <p:cxnSp>
+        <p:nvCxnSpPr>
+          <p:cNvPr id="8" name="Straight Arrow Connector 7"/>
+          <p:cNvCxnSpPr/>
+          <p:nvPr/>
+        </p:nvCxnSpPr>
+        <p:spPr>
+          <a:xfrm flipH="1">
+            <a:off x="2525585" y="2070579"/>
+            <a:ext cx="2123383" cy="2291871"/>
+          </a:xfrm>
+          <a:prstGeom prst="straightConnector1">
+            <a:avLst/>
+          </a:prstGeom>
+          <a:ln>
+            <a:solidFill>
+              <a:schemeClr val="tx1"/>
+            </a:solidFill>
+            <a:tailEnd type="triangle"/>
+          </a:ln>
+        </p:spPr>
+        <p:style>
+          <a:lnRef idx="1">
+            <a:schemeClr val="accent1"/>
+          </a:lnRef>
+          <a:fillRef idx="0">
+            <a:schemeClr val="accent1"/>
+          </a:fillRef>
+          <a:effectRef idx="0">
+            <a:schemeClr val="accent1"/>
+          </a:effectRef>
+          <a:fontRef idx="minor">
+            <a:schemeClr val="tx1"/>
+          </a:fontRef>
+        </p:style>
+      </p:cxnSp>
+      <p:cxnSp>
+        <p:nvCxnSpPr>
+          <p:cNvPr id="10" name="Straight Arrow Connector 9"/>
+          <p:cNvCxnSpPr/>
+          <p:nvPr/>
+        </p:nvCxnSpPr>
+        <p:spPr>
+          <a:xfrm>
+            <a:off x="6870957" y="1932609"/>
+            <a:ext cx="2663568" cy="2609521"/>
+          </a:xfrm>
+          <a:prstGeom prst="straightConnector1">
+            <a:avLst/>
+          </a:prstGeom>
+          <a:ln>
+            <a:solidFill>
+              <a:schemeClr val="tx1"/>
+            </a:solidFill>
+            <a:tailEnd type="triangle"/>
+          </a:ln>
+        </p:spPr>
+        <p:style>
+          <a:lnRef idx="1">
+            <a:schemeClr val="accent1"/>
+          </a:lnRef>
+          <a:fillRef idx="0">
+            <a:schemeClr val="accent1"/>
+          </a:fillRef>
+          <a:effectRef idx="0">
+            <a:schemeClr val="accent1"/>
+          </a:effectRef>
+          <a:fontRef idx="minor">
+            <a:schemeClr val="tx1"/>
+          </a:fontRef>
+        </p:style>
+      </p:cxnSp>
+      <p:cxnSp>
+        <p:nvCxnSpPr>
+          <p:cNvPr id="14" name="Straight Arrow Connector 13"/>
+          <p:cNvCxnSpPr>
+            <a:stCxn id="4" idx="6"/>
+          </p:cNvCxnSpPr>
+          <p:nvPr/>
+        </p:nvCxnSpPr>
+        <p:spPr>
+          <a:xfrm>
+            <a:off x="3050350" y="5288438"/>
+            <a:ext cx="6236704" cy="6602"/>
+          </a:xfrm>
+          <a:prstGeom prst="straightConnector1">
+            <a:avLst/>
+          </a:prstGeom>
+          <a:ln>
+            <a:solidFill>
+              <a:schemeClr val="tx1"/>
+            </a:solidFill>
+            <a:tailEnd type="triangle"/>
+          </a:ln>
+        </p:spPr>
+        <p:style>
+          <a:lnRef idx="1">
+            <a:schemeClr val="accent1"/>
+          </a:lnRef>
+          <a:fillRef idx="0">
+            <a:schemeClr val="accent1"/>
+          </a:fillRef>
+          <a:effectRef idx="0">
+            <a:schemeClr val="accent1"/>
+          </a:effectRef>
+          <a:fontRef idx="minor">
+            <a:schemeClr val="tx1"/>
+          </a:fontRef>
+        </p:style>
+      </p:cxnSp>
+      <p:sp>
+        <p:nvSpPr>
+          <p:cNvPr id="17" name="TextBox 16"/>
+          <p:cNvSpPr txBox="1"/>
+          <p:nvPr/>
+        </p:nvSpPr>
+        <p:spPr>
+          <a:xfrm rot="18727353">
+            <a:off x="2156466" y="2799194"/>
+            <a:ext cx="2606804" cy="553998"/>
+          </a:xfrm>
+          <a:prstGeom prst="rect">
+            <a:avLst/>
+          </a:prstGeom>
+          <a:noFill/>
+        </p:spPr>
+        <p:txBody>
+          <a:bodyPr wrap="none" rtlCol="0">
+            <a:spAutoFit/>
+          </a:bodyPr>
+          <a:lstStyle/>
+          <a:p>
+            <a:r>
+              <a:rPr lang="en-US" sz="3000" b="1" dirty="0" smtClean="0"/>
+              <a:t>multiplicity:1-1</a:t>
+            </a:r>
+            <a:endParaRPr lang="en-US" sz="3000" b="1" dirty="0"/>
+          </a:p>
+        </p:txBody>
+      </p:sp>
+      <p:sp>
+        <p:nvSpPr>
+          <p:cNvPr id="19" name="TextBox 18"/>
+          <p:cNvSpPr txBox="1"/>
+          <p:nvPr/>
+        </p:nvSpPr>
+        <p:spPr>
+          <a:xfrm rot="2685202">
+            <a:off x="6996222" y="2799055"/>
+            <a:ext cx="2606804" cy="553998"/>
+          </a:xfrm>
+          <a:prstGeom prst="rect">
+            <a:avLst/>
+          </a:prstGeom>
+          <a:noFill/>
+        </p:spPr>
+        <p:txBody>
+          <a:bodyPr wrap="none" rtlCol="0">
+            <a:spAutoFit/>
+          </a:bodyPr>
+          <a:lstStyle/>
+          <a:p>
+            <a:r>
+              <a:rPr lang="en-US" sz="3000" b="1" dirty="0" smtClean="0"/>
+              <a:t>multiplicity:1-1</a:t>
+            </a:r>
+            <a:endParaRPr lang="en-US" sz="3000" b="1" dirty="0"/>
+          </a:p>
+        </p:txBody>
+      </p:sp>
+      <p:sp>
+        <p:nvSpPr>
+          <p:cNvPr id="20" name="TextBox 19"/>
+          <p:cNvSpPr txBox="1"/>
+          <p:nvPr/>
+        </p:nvSpPr>
+        <p:spPr>
+          <a:xfrm>
+            <a:off x="4418805" y="4779142"/>
+            <a:ext cx="3295582" cy="553998"/>
+          </a:xfrm>
+          <a:prstGeom prst="rect">
+            <a:avLst/>
+          </a:prstGeom>
+          <a:noFill/>
+        </p:spPr>
+        <p:txBody>
+          <a:bodyPr wrap="none" rtlCol="0">
+            <a:spAutoFit/>
+          </a:bodyPr>
+          <a:lstStyle/>
+          <a:p>
+            <a:r>
+              <a:rPr lang="en-US" sz="3000" b="1" dirty="0" smtClean="0"/>
+              <a:t>multiplicity:many-1</a:t>
+            </a:r>
+            <a:endParaRPr lang="en-US" sz="3000" b="1" dirty="0"/>
+          </a:p>
+        </p:txBody>
+      </p:sp>
+    </p:spTree>
+    <p:extLst>
+      <p:ext uri="{BB962C8B-B14F-4D97-AF65-F5344CB8AC3E}">
+        <p14:creationId xmlns:p14="http://schemas.microsoft.com/office/powerpoint/2010/main" val="654016366"/>
       </p:ext>
     </p:extLst>
   </p:cSld>

</xml_diff>